<commit_message>
Focus images on poster infinity loop and align outline
</commit_message>
<xml_diff>
--- a/src/articles/devops-mindset-essentials.pptx
+++ b/src/articles/devops-mindset-essentials.pptx
@@ -6,6 +6,10 @@
   </p:sldMasterIdLst>
   <p:sldIdLst>
     <p:sldId id="256" r:id="rId2"/>
+    <p:sldId id="257" r:id="rId3"/>
+    <p:sldId id="259" r:id="rId4"/>
+    <p:sldId id="260" r:id="rId5"/>
+    <p:sldId id="261" r:id="rId6"/>
   </p:sldIdLst>
   <p:sldSz cx="12192000" cy="6858000"/>
   <p:notesSz cx="6858000" cy="9144000"/>
@@ -104,6 +108,11 @@
       </a:defRPr>
     </a:lvl9pPr>
   </p:defaultTextStyle>
+  <p:extLst>
+    <p:ext uri="{EFAFB233-063F-42B5-8137-9DF3F51BA10A}">
+      <p15:sldGuideLst xmlns:p15="http://schemas.microsoft.com/office/powerpoint/2012/main"/>
+    </p:ext>
+  </p:extLst>
 </p:presentation>
 </file>
 
@@ -3895,6 +3904,1106 @@
 </p:sld>
 </file>
 
+<file path=ppt/slides/slide2.xml><?xml version="1.0" encoding="utf-8"?>
+<p:sld xmlns:a="http://schemas.openxmlformats.org/drawingml/2006/main" xmlns:r="http://schemas.openxmlformats.org/officeDocument/2006/relationships" xmlns:p="http://schemas.openxmlformats.org/presentationml/2006/main">
+  <p:cSld>
+    <p:spTree>
+      <p:nvGrpSpPr>
+        <p:cNvPr id="1" name=""/>
+        <p:cNvGrpSpPr/>
+        <p:nvPr/>
+      </p:nvGrpSpPr>
+      <p:grpSpPr>
+        <a:xfrm>
+          <a:off x="0" y="0"/>
+          <a:ext cx="0" cy="0"/>
+          <a:chOff x="0" y="0"/>
+          <a:chExt cx="0" cy="0"/>
+        </a:xfrm>
+      </p:grpSpPr>
+      <p:pic>
+        <p:nvPicPr>
+          <p:cNvPr id="46" name="Picture 45">
+            <a:extLst>
+              <a:ext uri="{FF2B5EF4-FFF2-40B4-BE49-F238E27FC236}">
+                <a16:creationId xmlns:a16="http://schemas.microsoft.com/office/drawing/2014/main" id="{2B1844E2-A67F-4B28-B1D4-F998E8DAAE5C}"/>
+              </a:ext>
+            </a:extLst>
+          </p:cNvPr>
+          <p:cNvPicPr>
+            <a:picLocks noChangeAspect="1"/>
+          </p:cNvPicPr>
+          <p:nvPr/>
+        </p:nvPicPr>
+        <p:blipFill>
+          <a:blip r:embed="rId2"/>
+          <a:stretch>
+            <a:fillRect/>
+          </a:stretch>
+        </p:blipFill>
+        <p:spPr>
+          <a:xfrm>
+            <a:off x="3163596" y="1728719"/>
+            <a:ext cx="6815919" cy="3481118"/>
+          </a:xfrm>
+          <a:prstGeom prst="rect">
+            <a:avLst/>
+          </a:prstGeom>
+        </p:spPr>
+      </p:pic>
+      <p:pic>
+        <p:nvPicPr>
+          <p:cNvPr id="27" name="Picture 26">
+            <a:extLst>
+              <a:ext uri="{FF2B5EF4-FFF2-40B4-BE49-F238E27FC236}">
+                <a16:creationId xmlns:a16="http://schemas.microsoft.com/office/drawing/2014/main" id="{6D90026A-E699-42CB-86E6-620F6FD4662A}"/>
+              </a:ext>
+            </a:extLst>
+          </p:cNvPr>
+          <p:cNvPicPr>
+            <a:picLocks noChangeAspect="1"/>
+          </p:cNvPicPr>
+          <p:nvPr/>
+        </p:nvPicPr>
+        <p:blipFill>
+          <a:blip r:embed="rId3">
+            <a:extLst>
+              <a:ext uri="{28A0092B-C50C-407E-A947-70E740481C1C}">
+                <a14:useLocalDpi xmlns:a14="http://schemas.microsoft.com/office/drawing/2010/main" val="0"/>
+              </a:ext>
+            </a:extLst>
+          </a:blip>
+          <a:stretch>
+            <a:fillRect/>
+          </a:stretch>
+        </p:blipFill>
+        <p:spPr>
+          <a:xfrm>
+            <a:off x="91387" y="2749324"/>
+            <a:ext cx="2562180" cy="1440000"/>
+          </a:xfrm>
+          <a:prstGeom prst="rect">
+            <a:avLst/>
+          </a:prstGeom>
+          <a:ln w="6350">
+            <a:solidFill>
+              <a:schemeClr val="bg1">
+                <a:lumMod val="50000"/>
+              </a:schemeClr>
+            </a:solidFill>
+          </a:ln>
+        </p:spPr>
+      </p:pic>
+      <p:cxnSp>
+        <p:nvCxnSpPr>
+          <p:cNvPr id="29" name="Straight Connector 28">
+            <a:extLst>
+              <a:ext uri="{FF2B5EF4-FFF2-40B4-BE49-F238E27FC236}">
+                <a16:creationId xmlns:a16="http://schemas.microsoft.com/office/drawing/2014/main" id="{907959E8-2193-49A8-B75F-EBB49B2E5C76}"/>
+              </a:ext>
+            </a:extLst>
+          </p:cNvPr>
+          <p:cNvCxnSpPr>
+            <a:cxnSpLocks/>
+          </p:cNvCxnSpPr>
+          <p:nvPr/>
+        </p:nvCxnSpPr>
+        <p:spPr>
+          <a:xfrm flipV="1">
+            <a:off x="1378106" y="1765087"/>
+            <a:ext cx="3078612" cy="946783"/>
+          </a:xfrm>
+          <a:prstGeom prst="line">
+            <a:avLst/>
+          </a:prstGeom>
+          <a:ln>
+            <a:solidFill>
+              <a:schemeClr val="bg1">
+                <a:lumMod val="65000"/>
+              </a:schemeClr>
+            </a:solidFill>
+            <a:prstDash val="dash"/>
+          </a:ln>
+        </p:spPr>
+        <p:style>
+          <a:lnRef idx="1">
+            <a:schemeClr val="accent1"/>
+          </a:lnRef>
+          <a:fillRef idx="0">
+            <a:schemeClr val="accent1"/>
+          </a:fillRef>
+          <a:effectRef idx="0">
+            <a:schemeClr val="accent1"/>
+          </a:effectRef>
+          <a:fontRef idx="minor">
+            <a:schemeClr val="tx1"/>
+          </a:fontRef>
+        </p:style>
+      </p:cxnSp>
+      <p:cxnSp>
+        <p:nvCxnSpPr>
+          <p:cNvPr id="30" name="Straight Connector 29">
+            <a:extLst>
+              <a:ext uri="{FF2B5EF4-FFF2-40B4-BE49-F238E27FC236}">
+                <a16:creationId xmlns:a16="http://schemas.microsoft.com/office/drawing/2014/main" id="{A9354BCC-C347-4FEC-B090-7890BEBDA5F8}"/>
+              </a:ext>
+            </a:extLst>
+          </p:cNvPr>
+          <p:cNvCxnSpPr>
+            <a:cxnSpLocks/>
+          </p:cNvCxnSpPr>
+          <p:nvPr/>
+        </p:nvCxnSpPr>
+        <p:spPr>
+          <a:xfrm>
+            <a:off x="1381986" y="4244326"/>
+            <a:ext cx="3060925" cy="924047"/>
+          </a:xfrm>
+          <a:prstGeom prst="line">
+            <a:avLst/>
+          </a:prstGeom>
+          <a:ln>
+            <a:solidFill>
+              <a:schemeClr val="bg1">
+                <a:lumMod val="65000"/>
+              </a:schemeClr>
+            </a:solidFill>
+            <a:prstDash val="dash"/>
+          </a:ln>
+        </p:spPr>
+        <p:style>
+          <a:lnRef idx="1">
+            <a:schemeClr val="accent1"/>
+          </a:lnRef>
+          <a:fillRef idx="0">
+            <a:schemeClr val="accent1"/>
+          </a:fillRef>
+          <a:effectRef idx="0">
+            <a:schemeClr val="accent1"/>
+          </a:effectRef>
+          <a:fontRef idx="minor">
+            <a:schemeClr val="tx1"/>
+          </a:fontRef>
+        </p:style>
+      </p:cxnSp>
+    </p:spTree>
+    <p:extLst>
+      <p:ext uri="{BB962C8B-B14F-4D97-AF65-F5344CB8AC3E}">
+        <p14:creationId xmlns:p14="http://schemas.microsoft.com/office/powerpoint/2010/main" val="1856713462"/>
+      </p:ext>
+    </p:extLst>
+  </p:cSld>
+  <p:clrMapOvr>
+    <a:masterClrMapping/>
+  </p:clrMapOvr>
+</p:sld>
+</file>
+
+<file path=ppt/slides/slide3.xml><?xml version="1.0" encoding="utf-8"?>
+<p:sld xmlns:a="http://schemas.openxmlformats.org/drawingml/2006/main" xmlns:r="http://schemas.openxmlformats.org/officeDocument/2006/relationships" xmlns:p="http://schemas.openxmlformats.org/presentationml/2006/main">
+  <p:cSld>
+    <p:spTree>
+      <p:nvGrpSpPr>
+        <p:cNvPr id="1" name=""/>
+        <p:cNvGrpSpPr/>
+        <p:nvPr/>
+      </p:nvGrpSpPr>
+      <p:grpSpPr>
+        <a:xfrm>
+          <a:off x="0" y="0"/>
+          <a:ext cx="0" cy="0"/>
+          <a:chOff x="0" y="0"/>
+          <a:chExt cx="0" cy="0"/>
+        </a:xfrm>
+      </p:grpSpPr>
+      <p:pic>
+        <p:nvPicPr>
+          <p:cNvPr id="5" name="Picture 4">
+            <a:extLst>
+              <a:ext uri="{FF2B5EF4-FFF2-40B4-BE49-F238E27FC236}">
+                <a16:creationId xmlns:a16="http://schemas.microsoft.com/office/drawing/2014/main" id="{A9917661-DD47-499D-ADA3-09FB9CEFD0B6}"/>
+              </a:ext>
+            </a:extLst>
+          </p:cNvPr>
+          <p:cNvPicPr>
+            <a:picLocks noChangeAspect="1"/>
+          </p:cNvPicPr>
+          <p:nvPr/>
+        </p:nvPicPr>
+        <p:blipFill>
+          <a:blip r:embed="rId2"/>
+          <a:stretch>
+            <a:fillRect/>
+          </a:stretch>
+        </p:blipFill>
+        <p:spPr>
+          <a:xfrm>
+            <a:off x="3157404" y="1724152"/>
+            <a:ext cx="6834208" cy="3505504"/>
+          </a:xfrm>
+          <a:prstGeom prst="rect">
+            <a:avLst/>
+          </a:prstGeom>
+        </p:spPr>
+      </p:pic>
+      <p:pic>
+        <p:nvPicPr>
+          <p:cNvPr id="3" name="Picture 2">
+            <a:extLst>
+              <a:ext uri="{FF2B5EF4-FFF2-40B4-BE49-F238E27FC236}">
+                <a16:creationId xmlns:a16="http://schemas.microsoft.com/office/drawing/2014/main" id="{1D251076-4C18-4EC3-8B0A-2FE421E96E3E}"/>
+              </a:ext>
+            </a:extLst>
+          </p:cNvPr>
+          <p:cNvPicPr>
+            <a:picLocks noChangeAspect="1"/>
+          </p:cNvPicPr>
+          <p:nvPr/>
+        </p:nvPicPr>
+        <p:blipFill>
+          <a:blip r:embed="rId3">
+            <a:extLst>
+              <a:ext uri="{28A0092B-C50C-407E-A947-70E740481C1C}">
+                <a14:useLocalDpi xmlns:a14="http://schemas.microsoft.com/office/drawing/2010/main" val="0"/>
+              </a:ext>
+            </a:extLst>
+          </a:blip>
+          <a:stretch>
+            <a:fillRect/>
+          </a:stretch>
+        </p:blipFill>
+        <p:spPr>
+          <a:xfrm>
+            <a:off x="65970" y="2756904"/>
+            <a:ext cx="2562180" cy="1440000"/>
+          </a:xfrm>
+          <a:prstGeom prst="rect">
+            <a:avLst/>
+          </a:prstGeom>
+          <a:ln w="6350">
+            <a:solidFill>
+              <a:schemeClr val="bg1">
+                <a:lumMod val="50000"/>
+              </a:schemeClr>
+            </a:solidFill>
+          </a:ln>
+        </p:spPr>
+      </p:pic>
+      <p:cxnSp>
+        <p:nvCxnSpPr>
+          <p:cNvPr id="29" name="Straight Connector 28">
+            <a:extLst>
+              <a:ext uri="{FF2B5EF4-FFF2-40B4-BE49-F238E27FC236}">
+                <a16:creationId xmlns:a16="http://schemas.microsoft.com/office/drawing/2014/main" id="{907959E8-2193-49A8-B75F-EBB49B2E5C76}"/>
+              </a:ext>
+            </a:extLst>
+          </p:cNvPr>
+          <p:cNvCxnSpPr>
+            <a:cxnSpLocks/>
+          </p:cNvCxnSpPr>
+          <p:nvPr/>
+        </p:nvCxnSpPr>
+        <p:spPr>
+          <a:xfrm flipV="1">
+            <a:off x="1378106" y="1765087"/>
+            <a:ext cx="3078612" cy="946783"/>
+          </a:xfrm>
+          <a:prstGeom prst="line">
+            <a:avLst/>
+          </a:prstGeom>
+          <a:ln>
+            <a:solidFill>
+              <a:schemeClr val="bg1">
+                <a:lumMod val="65000"/>
+              </a:schemeClr>
+            </a:solidFill>
+            <a:prstDash val="dash"/>
+          </a:ln>
+        </p:spPr>
+        <p:style>
+          <a:lnRef idx="1">
+            <a:schemeClr val="accent1"/>
+          </a:lnRef>
+          <a:fillRef idx="0">
+            <a:schemeClr val="accent1"/>
+          </a:fillRef>
+          <a:effectRef idx="0">
+            <a:schemeClr val="accent1"/>
+          </a:effectRef>
+          <a:fontRef idx="minor">
+            <a:schemeClr val="tx1"/>
+          </a:fontRef>
+        </p:style>
+      </p:cxnSp>
+      <p:cxnSp>
+        <p:nvCxnSpPr>
+          <p:cNvPr id="30" name="Straight Connector 29">
+            <a:extLst>
+              <a:ext uri="{FF2B5EF4-FFF2-40B4-BE49-F238E27FC236}">
+                <a16:creationId xmlns:a16="http://schemas.microsoft.com/office/drawing/2014/main" id="{A9354BCC-C347-4FEC-B090-7890BEBDA5F8}"/>
+              </a:ext>
+            </a:extLst>
+          </p:cNvPr>
+          <p:cNvCxnSpPr>
+            <a:cxnSpLocks/>
+          </p:cNvCxnSpPr>
+          <p:nvPr/>
+        </p:nvCxnSpPr>
+        <p:spPr>
+          <a:xfrm>
+            <a:off x="1381986" y="4244326"/>
+            <a:ext cx="3060925" cy="924047"/>
+          </a:xfrm>
+          <a:prstGeom prst="line">
+            <a:avLst/>
+          </a:prstGeom>
+          <a:ln>
+            <a:solidFill>
+              <a:schemeClr val="bg1">
+                <a:lumMod val="65000"/>
+              </a:schemeClr>
+            </a:solidFill>
+            <a:prstDash val="dash"/>
+          </a:ln>
+        </p:spPr>
+        <p:style>
+          <a:lnRef idx="1">
+            <a:schemeClr val="accent1"/>
+          </a:lnRef>
+          <a:fillRef idx="0">
+            <a:schemeClr val="accent1"/>
+          </a:fillRef>
+          <a:effectRef idx="0">
+            <a:schemeClr val="accent1"/>
+          </a:effectRef>
+          <a:fontRef idx="minor">
+            <a:schemeClr val="tx1"/>
+          </a:fontRef>
+        </p:style>
+      </p:cxnSp>
+    </p:spTree>
+    <p:extLst>
+      <p:ext uri="{BB962C8B-B14F-4D97-AF65-F5344CB8AC3E}">
+        <p14:creationId xmlns:p14="http://schemas.microsoft.com/office/powerpoint/2010/main" val="1272186810"/>
+      </p:ext>
+    </p:extLst>
+  </p:cSld>
+  <p:clrMapOvr>
+    <a:masterClrMapping/>
+  </p:clrMapOvr>
+</p:sld>
+</file>
+
+<file path=ppt/slides/slide4.xml><?xml version="1.0" encoding="utf-8"?>
+<p:sld xmlns:a="http://schemas.openxmlformats.org/drawingml/2006/main" xmlns:r="http://schemas.openxmlformats.org/officeDocument/2006/relationships" xmlns:p="http://schemas.openxmlformats.org/presentationml/2006/main">
+  <p:cSld>
+    <p:spTree>
+      <p:nvGrpSpPr>
+        <p:cNvPr id="1" name=""/>
+        <p:cNvGrpSpPr/>
+        <p:nvPr/>
+      </p:nvGrpSpPr>
+      <p:grpSpPr>
+        <a:xfrm>
+          <a:off x="0" y="0"/>
+          <a:ext cx="0" cy="0"/>
+          <a:chOff x="0" y="0"/>
+          <a:chExt cx="0" cy="0"/>
+        </a:xfrm>
+      </p:grpSpPr>
+      <p:pic>
+        <p:nvPicPr>
+          <p:cNvPr id="6" name="Picture 5">
+            <a:extLst>
+              <a:ext uri="{FF2B5EF4-FFF2-40B4-BE49-F238E27FC236}">
+                <a16:creationId xmlns:a16="http://schemas.microsoft.com/office/drawing/2014/main" id="{0CF2E5D3-CB70-4025-8642-37A6C1632E3E}"/>
+              </a:ext>
+            </a:extLst>
+          </p:cNvPr>
+          <p:cNvPicPr>
+            <a:picLocks noChangeAspect="1"/>
+          </p:cNvPicPr>
+          <p:nvPr/>
+        </p:nvPicPr>
+        <p:blipFill>
+          <a:blip r:embed="rId2"/>
+          <a:stretch>
+            <a:fillRect/>
+          </a:stretch>
+        </p:blipFill>
+        <p:spPr>
+          <a:xfrm>
+            <a:off x="3162144" y="1765087"/>
+            <a:ext cx="6809822" cy="3444539"/>
+          </a:xfrm>
+          <a:prstGeom prst="rect">
+            <a:avLst/>
+          </a:prstGeom>
+        </p:spPr>
+      </p:pic>
+      <p:pic>
+        <p:nvPicPr>
+          <p:cNvPr id="3" name="Picture 2">
+            <a:extLst>
+              <a:ext uri="{FF2B5EF4-FFF2-40B4-BE49-F238E27FC236}">
+                <a16:creationId xmlns:a16="http://schemas.microsoft.com/office/drawing/2014/main" id="{02A2988B-A9A1-4989-983B-5C044E548A10}"/>
+              </a:ext>
+            </a:extLst>
+          </p:cNvPr>
+          <p:cNvPicPr>
+            <a:picLocks noChangeAspect="1"/>
+          </p:cNvPicPr>
+          <p:nvPr/>
+        </p:nvPicPr>
+        <p:blipFill>
+          <a:blip r:embed="rId3">
+            <a:extLst>
+              <a:ext uri="{28A0092B-C50C-407E-A947-70E740481C1C}">
+                <a14:useLocalDpi xmlns:a14="http://schemas.microsoft.com/office/drawing/2010/main" val="0"/>
+              </a:ext>
+            </a:extLst>
+          </a:blip>
+          <a:stretch>
+            <a:fillRect/>
+          </a:stretch>
+        </p:blipFill>
+        <p:spPr>
+          <a:xfrm>
+            <a:off x="100896" y="2747573"/>
+            <a:ext cx="2562180" cy="1440000"/>
+          </a:xfrm>
+          <a:prstGeom prst="rect">
+            <a:avLst/>
+          </a:prstGeom>
+          <a:ln w="6350">
+            <a:solidFill>
+              <a:schemeClr val="bg1">
+                <a:lumMod val="50000"/>
+              </a:schemeClr>
+            </a:solidFill>
+          </a:ln>
+        </p:spPr>
+      </p:pic>
+      <p:cxnSp>
+        <p:nvCxnSpPr>
+          <p:cNvPr id="29" name="Straight Connector 28">
+            <a:extLst>
+              <a:ext uri="{FF2B5EF4-FFF2-40B4-BE49-F238E27FC236}">
+                <a16:creationId xmlns:a16="http://schemas.microsoft.com/office/drawing/2014/main" id="{907959E8-2193-49A8-B75F-EBB49B2E5C76}"/>
+              </a:ext>
+            </a:extLst>
+          </p:cNvPr>
+          <p:cNvCxnSpPr>
+            <a:cxnSpLocks/>
+          </p:cNvCxnSpPr>
+          <p:nvPr/>
+        </p:nvCxnSpPr>
+        <p:spPr>
+          <a:xfrm flipV="1">
+            <a:off x="1378106" y="1765087"/>
+            <a:ext cx="3078612" cy="946783"/>
+          </a:xfrm>
+          <a:prstGeom prst="line">
+            <a:avLst/>
+          </a:prstGeom>
+          <a:ln>
+            <a:solidFill>
+              <a:schemeClr val="bg1">
+                <a:lumMod val="65000"/>
+              </a:schemeClr>
+            </a:solidFill>
+            <a:prstDash val="dash"/>
+          </a:ln>
+        </p:spPr>
+        <p:style>
+          <a:lnRef idx="1">
+            <a:schemeClr val="accent1"/>
+          </a:lnRef>
+          <a:fillRef idx="0">
+            <a:schemeClr val="accent1"/>
+          </a:fillRef>
+          <a:effectRef idx="0">
+            <a:schemeClr val="accent1"/>
+          </a:effectRef>
+          <a:fontRef idx="minor">
+            <a:schemeClr val="tx1"/>
+          </a:fontRef>
+        </p:style>
+      </p:cxnSp>
+      <p:cxnSp>
+        <p:nvCxnSpPr>
+          <p:cNvPr id="30" name="Straight Connector 29">
+            <a:extLst>
+              <a:ext uri="{FF2B5EF4-FFF2-40B4-BE49-F238E27FC236}">
+                <a16:creationId xmlns:a16="http://schemas.microsoft.com/office/drawing/2014/main" id="{A9354BCC-C347-4FEC-B090-7890BEBDA5F8}"/>
+              </a:ext>
+            </a:extLst>
+          </p:cNvPr>
+          <p:cNvCxnSpPr>
+            <a:cxnSpLocks/>
+          </p:cNvCxnSpPr>
+          <p:nvPr/>
+        </p:nvCxnSpPr>
+        <p:spPr>
+          <a:xfrm>
+            <a:off x="1381986" y="4244326"/>
+            <a:ext cx="3060925" cy="924047"/>
+          </a:xfrm>
+          <a:prstGeom prst="line">
+            <a:avLst/>
+          </a:prstGeom>
+          <a:ln>
+            <a:solidFill>
+              <a:schemeClr val="bg1">
+                <a:lumMod val="65000"/>
+              </a:schemeClr>
+            </a:solidFill>
+            <a:prstDash val="dash"/>
+          </a:ln>
+        </p:spPr>
+        <p:style>
+          <a:lnRef idx="1">
+            <a:schemeClr val="accent1"/>
+          </a:lnRef>
+          <a:fillRef idx="0">
+            <a:schemeClr val="accent1"/>
+          </a:fillRef>
+          <a:effectRef idx="0">
+            <a:schemeClr val="accent1"/>
+          </a:effectRef>
+          <a:fontRef idx="minor">
+            <a:schemeClr val="tx1"/>
+          </a:fontRef>
+        </p:style>
+      </p:cxnSp>
+    </p:spTree>
+    <p:extLst>
+      <p:ext uri="{BB962C8B-B14F-4D97-AF65-F5344CB8AC3E}">
+        <p14:creationId xmlns:p14="http://schemas.microsoft.com/office/powerpoint/2010/main" val="2712533191"/>
+      </p:ext>
+    </p:extLst>
+  </p:cSld>
+  <p:clrMapOvr>
+    <a:masterClrMapping/>
+  </p:clrMapOvr>
+</p:sld>
+</file>
+
+<file path=ppt/slides/slide5.xml><?xml version="1.0" encoding="utf-8"?>
+<p:sld xmlns:a="http://schemas.openxmlformats.org/drawingml/2006/main" xmlns:r="http://schemas.openxmlformats.org/officeDocument/2006/relationships" xmlns:p="http://schemas.openxmlformats.org/presentationml/2006/main">
+  <p:cSld>
+    <p:spTree>
+      <p:nvGrpSpPr>
+        <p:cNvPr id="1" name=""/>
+        <p:cNvGrpSpPr/>
+        <p:nvPr/>
+      </p:nvGrpSpPr>
+      <p:grpSpPr>
+        <a:xfrm>
+          <a:off x="0" y="0"/>
+          <a:ext cx="0" cy="0"/>
+          <a:chOff x="0" y="0"/>
+          <a:chExt cx="0" cy="0"/>
+        </a:xfrm>
+      </p:grpSpPr>
+      <p:pic>
+        <p:nvPicPr>
+          <p:cNvPr id="6" name="Picture 5">
+            <a:extLst>
+              <a:ext uri="{FF2B5EF4-FFF2-40B4-BE49-F238E27FC236}">
+                <a16:creationId xmlns:a16="http://schemas.microsoft.com/office/drawing/2014/main" id="{A580A17A-68E5-438C-B457-EAA937FD82B9}"/>
+              </a:ext>
+            </a:extLst>
+          </p:cNvPr>
+          <p:cNvPicPr>
+            <a:picLocks noChangeAspect="1"/>
+          </p:cNvPicPr>
+          <p:nvPr/>
+        </p:nvPicPr>
+        <p:blipFill>
+          <a:blip r:embed="rId2"/>
+          <a:stretch>
+            <a:fillRect/>
+          </a:stretch>
+        </p:blipFill>
+        <p:spPr>
+          <a:xfrm>
+            <a:off x="3124976" y="1679296"/>
+            <a:ext cx="6962235" cy="3499407"/>
+          </a:xfrm>
+          <a:prstGeom prst="rect">
+            <a:avLst/>
+          </a:prstGeom>
+        </p:spPr>
+      </p:pic>
+      <p:pic>
+        <p:nvPicPr>
+          <p:cNvPr id="3" name="Picture 2">
+            <a:extLst>
+              <a:ext uri="{FF2B5EF4-FFF2-40B4-BE49-F238E27FC236}">
+                <a16:creationId xmlns:a16="http://schemas.microsoft.com/office/drawing/2014/main" id="{81F9BA15-B68B-4F43-B052-ED817346D4AE}"/>
+              </a:ext>
+            </a:extLst>
+          </p:cNvPr>
+          <p:cNvPicPr>
+            <a:picLocks noChangeAspect="1"/>
+          </p:cNvPicPr>
+          <p:nvPr/>
+        </p:nvPicPr>
+        <p:blipFill>
+          <a:blip r:embed="rId3">
+            <a:extLst>
+              <a:ext uri="{28A0092B-C50C-407E-A947-70E740481C1C}">
+                <a14:useLocalDpi xmlns:a14="http://schemas.microsoft.com/office/drawing/2010/main" val="0"/>
+              </a:ext>
+            </a:extLst>
+          </a:blip>
+          <a:stretch>
+            <a:fillRect/>
+          </a:stretch>
+        </p:blipFill>
+        <p:spPr>
+          <a:xfrm>
+            <a:off x="100896" y="2747573"/>
+            <a:ext cx="2562180" cy="1440000"/>
+          </a:xfrm>
+          <a:prstGeom prst="rect">
+            <a:avLst/>
+          </a:prstGeom>
+          <a:ln w="6350">
+            <a:solidFill>
+              <a:schemeClr val="bg1">
+                <a:lumMod val="50000"/>
+              </a:schemeClr>
+            </a:solidFill>
+          </a:ln>
+        </p:spPr>
+      </p:pic>
+      <p:cxnSp>
+        <p:nvCxnSpPr>
+          <p:cNvPr id="29" name="Straight Connector 28">
+            <a:extLst>
+              <a:ext uri="{FF2B5EF4-FFF2-40B4-BE49-F238E27FC236}">
+                <a16:creationId xmlns:a16="http://schemas.microsoft.com/office/drawing/2014/main" id="{907959E8-2193-49A8-B75F-EBB49B2E5C76}"/>
+              </a:ext>
+            </a:extLst>
+          </p:cNvPr>
+          <p:cNvCxnSpPr>
+            <a:cxnSpLocks/>
+          </p:cNvCxnSpPr>
+          <p:nvPr/>
+        </p:nvCxnSpPr>
+        <p:spPr>
+          <a:xfrm flipV="1">
+            <a:off x="1378106" y="1765087"/>
+            <a:ext cx="3078612" cy="946783"/>
+          </a:xfrm>
+          <a:prstGeom prst="line">
+            <a:avLst/>
+          </a:prstGeom>
+          <a:ln>
+            <a:solidFill>
+              <a:schemeClr val="bg1">
+                <a:lumMod val="65000"/>
+              </a:schemeClr>
+            </a:solidFill>
+            <a:prstDash val="dash"/>
+          </a:ln>
+        </p:spPr>
+        <p:style>
+          <a:lnRef idx="1">
+            <a:schemeClr val="accent1"/>
+          </a:lnRef>
+          <a:fillRef idx="0">
+            <a:schemeClr val="accent1"/>
+          </a:fillRef>
+          <a:effectRef idx="0">
+            <a:schemeClr val="accent1"/>
+          </a:effectRef>
+          <a:fontRef idx="minor">
+            <a:schemeClr val="tx1"/>
+          </a:fontRef>
+        </p:style>
+      </p:cxnSp>
+      <p:cxnSp>
+        <p:nvCxnSpPr>
+          <p:cNvPr id="30" name="Straight Connector 29">
+            <a:extLst>
+              <a:ext uri="{FF2B5EF4-FFF2-40B4-BE49-F238E27FC236}">
+                <a16:creationId xmlns:a16="http://schemas.microsoft.com/office/drawing/2014/main" id="{A9354BCC-C347-4FEC-B090-7890BEBDA5F8}"/>
+              </a:ext>
+            </a:extLst>
+          </p:cNvPr>
+          <p:cNvCxnSpPr>
+            <a:cxnSpLocks/>
+          </p:cNvCxnSpPr>
+          <p:nvPr/>
+        </p:nvCxnSpPr>
+        <p:spPr>
+          <a:xfrm>
+            <a:off x="1381986" y="4244326"/>
+            <a:ext cx="3060925" cy="924047"/>
+          </a:xfrm>
+          <a:prstGeom prst="line">
+            <a:avLst/>
+          </a:prstGeom>
+          <a:ln>
+            <a:solidFill>
+              <a:schemeClr val="bg1">
+                <a:lumMod val="65000"/>
+              </a:schemeClr>
+            </a:solidFill>
+            <a:prstDash val="dash"/>
+          </a:ln>
+        </p:spPr>
+        <p:style>
+          <a:lnRef idx="1">
+            <a:schemeClr val="accent1"/>
+          </a:lnRef>
+          <a:fillRef idx="0">
+            <a:schemeClr val="accent1"/>
+          </a:fillRef>
+          <a:effectRef idx="0">
+            <a:schemeClr val="accent1"/>
+          </a:effectRef>
+          <a:fontRef idx="minor">
+            <a:schemeClr val="tx1"/>
+          </a:fontRef>
+        </p:style>
+      </p:cxnSp>
+      <p:pic>
+        <p:nvPicPr>
+          <p:cNvPr id="51" name="Picture 50">
+            <a:extLst>
+              <a:ext uri="{FF2B5EF4-FFF2-40B4-BE49-F238E27FC236}">
+                <a16:creationId xmlns:a16="http://schemas.microsoft.com/office/drawing/2014/main" id="{5DE430C0-BD70-4CB8-A28E-74319CC08532}"/>
+              </a:ext>
+            </a:extLst>
+          </p:cNvPr>
+          <p:cNvPicPr>
+            <a:picLocks noChangeAspect="1"/>
+          </p:cNvPicPr>
+          <p:nvPr/>
+        </p:nvPicPr>
+        <p:blipFill>
+          <a:blip r:embed="rId4">
+            <a:grayscl/>
+            <a:extLst>
+              <a:ext uri="{28A0092B-C50C-407E-A947-70E740481C1C}">
+                <a14:useLocalDpi xmlns:a14="http://schemas.microsoft.com/office/drawing/2010/main" val="0"/>
+              </a:ext>
+            </a:extLst>
+          </a:blip>
+          <a:stretch>
+            <a:fillRect/>
+          </a:stretch>
+        </p:blipFill>
+        <p:spPr>
+          <a:xfrm>
+            <a:off x="6876681" y="186612"/>
+            <a:ext cx="1921635" cy="1080000"/>
+          </a:xfrm>
+          <a:prstGeom prst="rect">
+            <a:avLst/>
+          </a:prstGeom>
+          <a:ln w="6350">
+            <a:solidFill>
+              <a:schemeClr val="bg1">
+                <a:lumMod val="50000"/>
+              </a:schemeClr>
+            </a:solidFill>
+          </a:ln>
+        </p:spPr>
+      </p:pic>
+      <p:pic>
+        <p:nvPicPr>
+          <p:cNvPr id="52" name="Picture 51">
+            <a:extLst>
+              <a:ext uri="{FF2B5EF4-FFF2-40B4-BE49-F238E27FC236}">
+                <a16:creationId xmlns:a16="http://schemas.microsoft.com/office/drawing/2014/main" id="{7BCE8037-38CC-4C6A-A6A7-3C5E4E9FE9A9}"/>
+              </a:ext>
+            </a:extLst>
+          </p:cNvPr>
+          <p:cNvPicPr>
+            <a:picLocks noChangeAspect="1"/>
+          </p:cNvPicPr>
+          <p:nvPr/>
+        </p:nvPicPr>
+        <p:blipFill>
+          <a:blip r:embed="rId5">
+            <a:grayscl/>
+            <a:extLst>
+              <a:ext uri="{28A0092B-C50C-407E-A947-70E740481C1C}">
+                <a14:useLocalDpi xmlns:a14="http://schemas.microsoft.com/office/drawing/2010/main" val="0"/>
+              </a:ext>
+            </a:extLst>
+          </a:blip>
+          <a:stretch>
+            <a:fillRect/>
+          </a:stretch>
+        </p:blipFill>
+        <p:spPr>
+          <a:xfrm>
+            <a:off x="7276576" y="5591388"/>
+            <a:ext cx="1921635" cy="1080000"/>
+          </a:xfrm>
+          <a:prstGeom prst="rect">
+            <a:avLst/>
+          </a:prstGeom>
+          <a:ln w="6350">
+            <a:solidFill>
+              <a:schemeClr val="bg1">
+                <a:lumMod val="50000"/>
+              </a:schemeClr>
+            </a:solidFill>
+          </a:ln>
+        </p:spPr>
+      </p:pic>
+      <p:pic>
+        <p:nvPicPr>
+          <p:cNvPr id="53" name="Picture 52">
+            <a:extLst>
+              <a:ext uri="{FF2B5EF4-FFF2-40B4-BE49-F238E27FC236}">
+                <a16:creationId xmlns:a16="http://schemas.microsoft.com/office/drawing/2014/main" id="{F232469F-B374-4099-BDCC-88579ECC3932}"/>
+              </a:ext>
+            </a:extLst>
+          </p:cNvPr>
+          <p:cNvPicPr>
+            <a:picLocks noChangeAspect="1"/>
+          </p:cNvPicPr>
+          <p:nvPr/>
+        </p:nvPicPr>
+        <p:blipFill>
+          <a:blip r:embed="rId6">
+            <a:grayscl/>
+            <a:extLst>
+              <a:ext uri="{28A0092B-C50C-407E-A947-70E740481C1C}">
+                <a14:useLocalDpi xmlns:a14="http://schemas.microsoft.com/office/drawing/2010/main" val="0"/>
+              </a:ext>
+            </a:extLst>
+          </a:blip>
+          <a:stretch>
+            <a:fillRect/>
+          </a:stretch>
+        </p:blipFill>
+        <p:spPr>
+          <a:xfrm>
+            <a:off x="5064205" y="5591388"/>
+            <a:ext cx="1921635" cy="1080000"/>
+          </a:xfrm>
+          <a:prstGeom prst="rect">
+            <a:avLst/>
+          </a:prstGeom>
+          <a:ln w="6350">
+            <a:solidFill>
+              <a:schemeClr val="bg1">
+                <a:lumMod val="50000"/>
+              </a:schemeClr>
+            </a:solidFill>
+          </a:ln>
+        </p:spPr>
+      </p:pic>
+      <p:cxnSp>
+        <p:nvCxnSpPr>
+          <p:cNvPr id="55" name="Straight Connector 54">
+            <a:extLst>
+              <a:ext uri="{FF2B5EF4-FFF2-40B4-BE49-F238E27FC236}">
+                <a16:creationId xmlns:a16="http://schemas.microsoft.com/office/drawing/2014/main" id="{76C71248-7F34-41EC-ABAF-C015EA6B6C07}"/>
+              </a:ext>
+            </a:extLst>
+          </p:cNvPr>
+          <p:cNvCxnSpPr>
+            <a:cxnSpLocks/>
+            <a:endCxn id="51" idx="2"/>
+          </p:cNvCxnSpPr>
+          <p:nvPr/>
+        </p:nvCxnSpPr>
+        <p:spPr>
+          <a:xfrm flipV="1">
+            <a:off x="7837498" y="1266612"/>
+            <a:ext cx="1" cy="683486"/>
+          </a:xfrm>
+          <a:prstGeom prst="line">
+            <a:avLst/>
+          </a:prstGeom>
+          <a:noFill/>
+          <a:ln w="10000" cap="flat" cmpd="sng" algn="ctr">
+            <a:solidFill>
+              <a:srgbClr val="FFFFFF">
+                <a:lumMod val="65000"/>
+              </a:srgbClr>
+            </a:solidFill>
+            <a:prstDash val="solid"/>
+            <a:headEnd type="oval"/>
+            <a:tailEnd type="oval"/>
+          </a:ln>
+          <a:effectLst/>
+        </p:spPr>
+      </p:cxnSp>
+      <p:cxnSp>
+        <p:nvCxnSpPr>
+          <p:cNvPr id="56" name="Straight Connector 55">
+            <a:extLst>
+              <a:ext uri="{FF2B5EF4-FFF2-40B4-BE49-F238E27FC236}">
+                <a16:creationId xmlns:a16="http://schemas.microsoft.com/office/drawing/2014/main" id="{1BCDA047-22D9-4C82-911C-E0496D4E56FE}"/>
+              </a:ext>
+            </a:extLst>
+          </p:cNvPr>
+          <p:cNvCxnSpPr>
+            <a:cxnSpLocks/>
+          </p:cNvCxnSpPr>
+          <p:nvPr/>
+        </p:nvCxnSpPr>
+        <p:spPr>
+          <a:xfrm flipV="1">
+            <a:off x="7122153" y="4484887"/>
+            <a:ext cx="0" cy="981193"/>
+          </a:xfrm>
+          <a:prstGeom prst="line">
+            <a:avLst/>
+          </a:prstGeom>
+          <a:noFill/>
+          <a:ln w="10000" cap="flat" cmpd="sng" algn="ctr">
+            <a:solidFill>
+              <a:srgbClr val="FFFFFF">
+                <a:lumMod val="65000"/>
+              </a:srgbClr>
+            </a:solidFill>
+            <a:prstDash val="solid"/>
+            <a:headEnd type="oval"/>
+            <a:tailEnd type="oval"/>
+          </a:ln>
+          <a:effectLst/>
+        </p:spPr>
+      </p:cxnSp>
+      <p:cxnSp>
+        <p:nvCxnSpPr>
+          <p:cNvPr id="57" name="Straight Connector 56">
+            <a:extLst>
+              <a:ext uri="{FF2B5EF4-FFF2-40B4-BE49-F238E27FC236}">
+                <a16:creationId xmlns:a16="http://schemas.microsoft.com/office/drawing/2014/main" id="{FF37F042-160A-46CC-A3D3-1A9C8A8D6B6C}"/>
+              </a:ext>
+            </a:extLst>
+          </p:cNvPr>
+          <p:cNvCxnSpPr>
+            <a:cxnSpLocks/>
+          </p:cNvCxnSpPr>
+          <p:nvPr/>
+        </p:nvCxnSpPr>
+        <p:spPr>
+          <a:xfrm flipV="1">
+            <a:off x="8172881" y="5019040"/>
+            <a:ext cx="0" cy="447041"/>
+          </a:xfrm>
+          <a:prstGeom prst="line">
+            <a:avLst/>
+          </a:prstGeom>
+          <a:noFill/>
+          <a:ln w="10000" cap="flat" cmpd="sng" algn="ctr">
+            <a:solidFill>
+              <a:srgbClr val="FFFFFF">
+                <a:lumMod val="65000"/>
+              </a:srgbClr>
+            </a:solidFill>
+            <a:prstDash val="solid"/>
+            <a:headEnd type="oval"/>
+            <a:tailEnd type="oval"/>
+          </a:ln>
+          <a:effectLst/>
+        </p:spPr>
+      </p:cxnSp>
+      <p:cxnSp>
+        <p:nvCxnSpPr>
+          <p:cNvPr id="19" name="Straight Connector 18">
+            <a:extLst>
+              <a:ext uri="{FF2B5EF4-FFF2-40B4-BE49-F238E27FC236}">
+                <a16:creationId xmlns:a16="http://schemas.microsoft.com/office/drawing/2014/main" id="{B98BC87B-1831-439C-AFD8-63BAC4B7781B}"/>
+              </a:ext>
+            </a:extLst>
+          </p:cNvPr>
+          <p:cNvCxnSpPr/>
+          <p:nvPr/>
+        </p:nvCxnSpPr>
+        <p:spPr>
+          <a:xfrm>
+            <a:off x="5064205" y="5466080"/>
+            <a:ext cx="4134006" cy="0"/>
+          </a:xfrm>
+          <a:prstGeom prst="line">
+            <a:avLst/>
+          </a:prstGeom>
+          <a:ln>
+            <a:solidFill>
+              <a:schemeClr val="bg1">
+                <a:lumMod val="50000"/>
+              </a:schemeClr>
+            </a:solidFill>
+          </a:ln>
+        </p:spPr>
+        <p:style>
+          <a:lnRef idx="1">
+            <a:schemeClr val="accent1"/>
+          </a:lnRef>
+          <a:fillRef idx="0">
+            <a:schemeClr val="accent1"/>
+          </a:fillRef>
+          <a:effectRef idx="0">
+            <a:schemeClr val="accent1"/>
+          </a:effectRef>
+          <a:fontRef idx="minor">
+            <a:schemeClr val="tx1"/>
+          </a:fontRef>
+        </p:style>
+      </p:cxnSp>
+      <p:cxnSp>
+        <p:nvCxnSpPr>
+          <p:cNvPr id="60" name="Straight Connector 59">
+            <a:extLst>
+              <a:ext uri="{FF2B5EF4-FFF2-40B4-BE49-F238E27FC236}">
+                <a16:creationId xmlns:a16="http://schemas.microsoft.com/office/drawing/2014/main" id="{79B9C94C-24BC-4CE1-A692-6B59A5EAB421}"/>
+              </a:ext>
+            </a:extLst>
+          </p:cNvPr>
+          <p:cNvCxnSpPr>
+            <a:cxnSpLocks/>
+          </p:cNvCxnSpPr>
+          <p:nvPr/>
+        </p:nvCxnSpPr>
+        <p:spPr>
+          <a:xfrm flipV="1">
+            <a:off x="6060433" y="4484886"/>
+            <a:ext cx="0" cy="981193"/>
+          </a:xfrm>
+          <a:prstGeom prst="line">
+            <a:avLst/>
+          </a:prstGeom>
+          <a:noFill/>
+          <a:ln w="10000" cap="flat" cmpd="sng" algn="ctr">
+            <a:solidFill>
+              <a:srgbClr val="FFFFFF">
+                <a:lumMod val="65000"/>
+              </a:srgbClr>
+            </a:solidFill>
+            <a:prstDash val="solid"/>
+            <a:headEnd type="oval"/>
+            <a:tailEnd type="oval"/>
+          </a:ln>
+          <a:effectLst/>
+        </p:spPr>
+      </p:cxnSp>
+    </p:spTree>
+    <p:extLst>
+      <p:ext uri="{BB962C8B-B14F-4D97-AF65-F5344CB8AC3E}">
+        <p14:creationId xmlns:p14="http://schemas.microsoft.com/office/powerpoint/2010/main" val="2150016624"/>
+      </p:ext>
+    </p:extLst>
+  </p:cSld>
+  <p:clrMapOvr>
+    <a:masterClrMapping/>
+  </p:clrMapOvr>
+</p:sld>
+</file>
+
 <file path=ppt/theme/theme1.xml><?xml version="1.0" encoding="utf-8"?>
 <a:theme xmlns:a="http://schemas.openxmlformats.org/drawingml/2006/main" name="Office Theme">
   <a:themeElements>

</xml_diff>

<commit_message>
Change colour of posters  in article.
</commit_message>
<xml_diff>
--- a/src/articles/devops-mindset-essentials.pptx
+++ b/src/articles/devops-mindset-essentials.pptx
@@ -10,6 +10,7 @@
     <p:sldId id="259" r:id="rId4"/>
     <p:sldId id="260" r:id="rId5"/>
     <p:sldId id="261" r:id="rId6"/>
+    <p:sldId id="262" r:id="rId7"/>
   </p:sldIdLst>
   <p:sldSz cx="12192000" cy="6858000"/>
   <p:notesSz cx="6858000" cy="9144000"/>
@@ -116,6 +117,183 @@
 </p:presentation>
 </file>
 
+<file path=ppt/revisionInfo.xml><?xml version="1.0" encoding="utf-8"?>
+<p1510:revInfo xmlns:a="http://schemas.openxmlformats.org/drawingml/2006/main" xmlns:r="http://schemas.openxmlformats.org/officeDocument/2006/relationships" xmlns:p1510="http://schemas.microsoft.com/office/powerpoint/2015/10/main">
+  <p1510:revLst>
+    <p1510:client id="{7680898E-CD27-4509-96F4-1C2ED3879AF2}" v="31" dt="2018-07-07T17:15:28.927"/>
+  </p1510:revLst>
+</p1510:revInfo>
+</file>
+
+<file path=ppt/changesInfos/changesInfo1.xml><?xml version="1.0" encoding="utf-8"?>
+<pc:chgInfo xmlns:a="http://schemas.openxmlformats.org/drawingml/2006/main" xmlns:r="http://schemas.openxmlformats.org/officeDocument/2006/relationships" xmlns:ac="http://schemas.microsoft.com/office/drawing/2013/main/command" xmlns:pc="http://schemas.microsoft.com/office/powerpoint/2013/main/command">
+  <pc:docChgLst>
+    <pc:chgData userId="707b42e47e16ca84" providerId="LiveId" clId="{7680898E-CD27-4509-96F4-1C2ED3879AF2}"/>
+    <pc:docChg chg="undo custSel mod addSld modSld">
+      <pc:chgData name="" userId="707b42e47e16ca84" providerId="LiveId" clId="{7680898E-CD27-4509-96F4-1C2ED3879AF2}" dt="2018-07-07T17:15:28.927" v="29" actId="478"/>
+      <pc:docMkLst>
+        <pc:docMk/>
+      </pc:docMkLst>
+      <pc:sldChg chg="addSp delSp modSp">
+        <pc:chgData name="" userId="707b42e47e16ca84" providerId="LiveId" clId="{7680898E-CD27-4509-96F4-1C2ED3879AF2}" dt="2018-07-07T17:02:46.698" v="4" actId="478"/>
+        <pc:sldMkLst>
+          <pc:docMk/>
+          <pc:sldMk cId="1856713462" sldId="257"/>
+        </pc:sldMkLst>
+        <pc:picChg chg="add mod ord">
+          <ac:chgData name="" userId="707b42e47e16ca84" providerId="LiveId" clId="{7680898E-CD27-4509-96F4-1C2ED3879AF2}" dt="2018-07-07T17:02:45.157" v="3" actId="167"/>
+          <ac:picMkLst>
+            <pc:docMk/>
+            <pc:sldMk cId="1856713462" sldId="257"/>
+            <ac:picMk id="3" creationId="{F3AC5A7D-FE77-4734-8A65-3D7B56FC663C}"/>
+          </ac:picMkLst>
+        </pc:picChg>
+        <pc:picChg chg="del">
+          <ac:chgData name="" userId="707b42e47e16ca84" providerId="LiveId" clId="{7680898E-CD27-4509-96F4-1C2ED3879AF2}" dt="2018-07-07T17:02:46.698" v="4" actId="478"/>
+          <ac:picMkLst>
+            <pc:docMk/>
+            <pc:sldMk cId="1856713462" sldId="257"/>
+            <ac:picMk id="27" creationId="{6D90026A-E699-42CB-86E6-620F6FD4662A}"/>
+          </ac:picMkLst>
+        </pc:picChg>
+      </pc:sldChg>
+      <pc:sldChg chg="addSp delSp modSp">
+        <pc:chgData name="" userId="707b42e47e16ca84" providerId="LiveId" clId="{7680898E-CD27-4509-96F4-1C2ED3879AF2}" dt="2018-07-07T17:03:09.375" v="11" actId="478"/>
+        <pc:sldMkLst>
+          <pc:docMk/>
+          <pc:sldMk cId="1272186810" sldId="259"/>
+        </pc:sldMkLst>
+        <pc:graphicFrameChg chg="add del mod">
+          <ac:chgData name="" userId="707b42e47e16ca84" providerId="LiveId" clId="{7680898E-CD27-4509-96F4-1C2ED3879AF2}" dt="2018-07-07T17:02:55.799" v="6" actId="478"/>
+          <ac:graphicFrameMkLst>
+            <pc:docMk/>
+            <pc:sldMk cId="1272186810" sldId="259"/>
+            <ac:graphicFrameMk id="2" creationId="{ADE7A06E-0637-4B41-A1D6-328B44C2A16A}"/>
+          </ac:graphicFrameMkLst>
+        </pc:graphicFrameChg>
+        <pc:picChg chg="del">
+          <ac:chgData name="" userId="707b42e47e16ca84" providerId="LiveId" clId="{7680898E-CD27-4509-96F4-1C2ED3879AF2}" dt="2018-07-07T17:03:09.375" v="11" actId="478"/>
+          <ac:picMkLst>
+            <pc:docMk/>
+            <pc:sldMk cId="1272186810" sldId="259"/>
+            <ac:picMk id="3" creationId="{1D251076-4C18-4EC3-8B0A-2FE421E96E3E}"/>
+          </ac:picMkLst>
+        </pc:picChg>
+        <pc:picChg chg="add mod ord">
+          <ac:chgData name="" userId="707b42e47e16ca84" providerId="LiveId" clId="{7680898E-CD27-4509-96F4-1C2ED3879AF2}" dt="2018-07-07T17:03:07.625" v="10" actId="167"/>
+          <ac:picMkLst>
+            <pc:docMk/>
+            <pc:sldMk cId="1272186810" sldId="259"/>
+            <ac:picMk id="6" creationId="{4DB42CF9-A830-446A-9AE7-4EBBAA7F4FA3}"/>
+          </ac:picMkLst>
+        </pc:picChg>
+      </pc:sldChg>
+      <pc:sldChg chg="addSp delSp modSp">
+        <pc:chgData name="" userId="707b42e47e16ca84" providerId="LiveId" clId="{7680898E-CD27-4509-96F4-1C2ED3879AF2}" dt="2018-07-07T17:03:29.564" v="16" actId="478"/>
+        <pc:sldMkLst>
+          <pc:docMk/>
+          <pc:sldMk cId="2712533191" sldId="260"/>
+        </pc:sldMkLst>
+        <pc:picChg chg="del">
+          <ac:chgData name="" userId="707b42e47e16ca84" providerId="LiveId" clId="{7680898E-CD27-4509-96F4-1C2ED3879AF2}" dt="2018-07-07T17:03:29.564" v="16" actId="478"/>
+          <ac:picMkLst>
+            <pc:docMk/>
+            <pc:sldMk cId="2712533191" sldId="260"/>
+            <ac:picMk id="3" creationId="{02A2988B-A9A1-4989-983B-5C044E548A10}"/>
+          </ac:picMkLst>
+        </pc:picChg>
+        <pc:picChg chg="add mod ord">
+          <ac:chgData name="" userId="707b42e47e16ca84" providerId="LiveId" clId="{7680898E-CD27-4509-96F4-1C2ED3879AF2}" dt="2018-07-07T17:03:27.971" v="15" actId="167"/>
+          <ac:picMkLst>
+            <pc:docMk/>
+            <pc:sldMk cId="2712533191" sldId="260"/>
+            <ac:picMk id="4" creationId="{7D211156-A236-47C8-A6E0-C31E5B960D5B}"/>
+          </ac:picMkLst>
+        </pc:picChg>
+      </pc:sldChg>
+      <pc:sldChg chg="addSp delSp modSp">
+        <pc:chgData name="" userId="707b42e47e16ca84" providerId="LiveId" clId="{7680898E-CD27-4509-96F4-1C2ED3879AF2}" dt="2018-07-07T17:03:50.007" v="21" actId="478"/>
+        <pc:sldMkLst>
+          <pc:docMk/>
+          <pc:sldMk cId="2150016624" sldId="261"/>
+        </pc:sldMkLst>
+        <pc:picChg chg="del">
+          <ac:chgData name="" userId="707b42e47e16ca84" providerId="LiveId" clId="{7680898E-CD27-4509-96F4-1C2ED3879AF2}" dt="2018-07-07T17:03:50.007" v="21" actId="478"/>
+          <ac:picMkLst>
+            <pc:docMk/>
+            <pc:sldMk cId="2150016624" sldId="261"/>
+            <ac:picMk id="3" creationId="{81F9BA15-B68B-4F43-B052-ED817346D4AE}"/>
+          </ac:picMkLst>
+        </pc:picChg>
+        <pc:picChg chg="add mod ord">
+          <ac:chgData name="" userId="707b42e47e16ca84" providerId="LiveId" clId="{7680898E-CD27-4509-96F4-1C2ED3879AF2}" dt="2018-07-07T17:03:48.064" v="20" actId="167"/>
+          <ac:picMkLst>
+            <pc:docMk/>
+            <pc:sldMk cId="2150016624" sldId="261"/>
+            <ac:picMk id="4" creationId="{0D1E4CE5-A32E-4EBC-9FC1-EEDBF01969AE}"/>
+          </ac:picMkLst>
+        </pc:picChg>
+      </pc:sldChg>
+      <pc:sldChg chg="addSp delSp modSp add mod setBg">
+        <pc:chgData name="" userId="707b42e47e16ca84" providerId="LiveId" clId="{7680898E-CD27-4509-96F4-1C2ED3879AF2}" dt="2018-07-07T17:15:28.927" v="29" actId="478"/>
+        <pc:sldMkLst>
+          <pc:docMk/>
+          <pc:sldMk cId="2768809047" sldId="262"/>
+        </pc:sldMkLst>
+        <pc:spChg chg="add del mod">
+          <ac:chgData name="" userId="707b42e47e16ca84" providerId="LiveId" clId="{7680898E-CD27-4509-96F4-1C2ED3879AF2}" dt="2018-07-07T17:15:28.927" v="29" actId="478"/>
+          <ac:spMkLst>
+            <pc:docMk/>
+            <pc:sldMk cId="2768809047" sldId="262"/>
+            <ac:spMk id="4" creationId="{988B00CB-19AA-472A-A3EB-960DDF967BAF}"/>
+          </ac:spMkLst>
+        </pc:spChg>
+        <pc:spChg chg="add del">
+          <ac:chgData name="" userId="707b42e47e16ca84" providerId="LiveId" clId="{7680898E-CD27-4509-96F4-1C2ED3879AF2}" dt="2018-07-07T17:15:21.949" v="25" actId="26606"/>
+          <ac:spMkLst>
+            <pc:docMk/>
+            <pc:sldMk cId="2768809047" sldId="262"/>
+            <ac:spMk id="9" creationId="{A4D1609B-102A-4C77-86A2-ACB29FB96D59}"/>
+          </ac:spMkLst>
+        </pc:spChg>
+        <pc:spChg chg="add del">
+          <ac:chgData name="" userId="707b42e47e16ca84" providerId="LiveId" clId="{7680898E-CD27-4509-96F4-1C2ED3879AF2}" dt="2018-07-07T17:15:21.949" v="25" actId="26606"/>
+          <ac:spMkLst>
+            <pc:docMk/>
+            <pc:sldMk cId="2768809047" sldId="262"/>
+            <ac:spMk id="11" creationId="{C651F706-C94E-46D4-BAAE-BAFD1AD976FE}"/>
+          </ac:spMkLst>
+        </pc:spChg>
+        <pc:spChg chg="add">
+          <ac:chgData name="" userId="707b42e47e16ca84" providerId="LiveId" clId="{7680898E-CD27-4509-96F4-1C2ED3879AF2}" dt="2018-07-07T17:15:21.966" v="26" actId="26606"/>
+          <ac:spMkLst>
+            <pc:docMk/>
+            <pc:sldMk cId="2768809047" sldId="262"/>
+            <ac:spMk id="13" creationId="{01D0AF59-99C3-4251-AB9A-C966C6AD4400}"/>
+          </ac:spMkLst>
+        </pc:spChg>
+        <pc:spChg chg="add">
+          <ac:chgData name="" userId="707b42e47e16ca84" providerId="LiveId" clId="{7680898E-CD27-4509-96F4-1C2ED3879AF2}" dt="2018-07-07T17:15:21.966" v="26" actId="26606"/>
+          <ac:spMkLst>
+            <pc:docMk/>
+            <pc:sldMk cId="2768809047" sldId="262"/>
+            <ac:spMk id="14" creationId="{1855405F-37A2-4869-9154-F8BE3BECE6C3}"/>
+          </ac:spMkLst>
+        </pc:spChg>
+        <pc:picChg chg="add mod">
+          <ac:chgData name="" userId="707b42e47e16ca84" providerId="LiveId" clId="{7680898E-CD27-4509-96F4-1C2ED3879AF2}" dt="2018-07-07T17:15:21.966" v="26" actId="26606"/>
+          <ac:picMkLst>
+            <pc:docMk/>
+            <pc:sldMk cId="2768809047" sldId="262"/>
+            <ac:picMk id="3" creationId="{571D036B-EF27-4899-8BF2-528FF9BDCC0B}"/>
+          </ac:picMkLst>
+        </pc:picChg>
+      </pc:sldChg>
+    </pc:docChg>
+  </pc:docChgLst>
+</pc:chgInfo>
+</file>
+
 <file path=ppt/slideLayouts/slideLayout1.xml><?xml version="1.0" encoding="utf-8"?>
 <p:sldLayout xmlns:a="http://schemas.openxmlformats.org/drawingml/2006/main" xmlns:r="http://schemas.openxmlformats.org/officeDocument/2006/relationships" xmlns:p="http://schemas.openxmlformats.org/presentationml/2006/main" type="title" preserve="1">
   <p:cSld name="Title Slide">
@@ -263,7 +441,7 @@
           <a:p>
             <a:fld id="{43C54877-A7F5-454C-8E09-C7623D142609}" type="datetimeFigureOut">
               <a:rPr lang="en-US" smtClean="0"/>
-              <a:t>6/29/2018</a:t>
+              <a:t>7/7/2018</a:t>
             </a:fld>
             <a:endParaRPr lang="en-US"/>
           </a:p>
@@ -461,7 +639,7 @@
           <a:p>
             <a:fld id="{43C54877-A7F5-454C-8E09-C7623D142609}" type="datetimeFigureOut">
               <a:rPr lang="en-US" smtClean="0"/>
-              <a:t>6/29/2018</a:t>
+              <a:t>7/7/2018</a:t>
             </a:fld>
             <a:endParaRPr lang="en-US"/>
           </a:p>
@@ -669,7 +847,7 @@
           <a:p>
             <a:fld id="{43C54877-A7F5-454C-8E09-C7623D142609}" type="datetimeFigureOut">
               <a:rPr lang="en-US" smtClean="0"/>
-              <a:t>6/29/2018</a:t>
+              <a:t>7/7/2018</a:t>
             </a:fld>
             <a:endParaRPr lang="en-US"/>
           </a:p>
@@ -867,7 +1045,7 @@
           <a:p>
             <a:fld id="{43C54877-A7F5-454C-8E09-C7623D142609}" type="datetimeFigureOut">
               <a:rPr lang="en-US" smtClean="0"/>
-              <a:t>6/29/2018</a:t>
+              <a:t>7/7/2018</a:t>
             </a:fld>
             <a:endParaRPr lang="en-US"/>
           </a:p>
@@ -1142,7 +1320,7 @@
           <a:p>
             <a:fld id="{43C54877-A7F5-454C-8E09-C7623D142609}" type="datetimeFigureOut">
               <a:rPr lang="en-US" smtClean="0"/>
-              <a:t>6/29/2018</a:t>
+              <a:t>7/7/2018</a:t>
             </a:fld>
             <a:endParaRPr lang="en-US"/>
           </a:p>
@@ -1407,7 +1585,7 @@
           <a:p>
             <a:fld id="{43C54877-A7F5-454C-8E09-C7623D142609}" type="datetimeFigureOut">
               <a:rPr lang="en-US" smtClean="0"/>
-              <a:t>6/29/2018</a:t>
+              <a:t>7/7/2018</a:t>
             </a:fld>
             <a:endParaRPr lang="en-US"/>
           </a:p>
@@ -1819,7 +1997,7 @@
           <a:p>
             <a:fld id="{43C54877-A7F5-454C-8E09-C7623D142609}" type="datetimeFigureOut">
               <a:rPr lang="en-US" smtClean="0"/>
-              <a:t>6/29/2018</a:t>
+              <a:t>7/7/2018</a:t>
             </a:fld>
             <a:endParaRPr lang="en-US"/>
           </a:p>
@@ -1960,7 +2138,7 @@
           <a:p>
             <a:fld id="{43C54877-A7F5-454C-8E09-C7623D142609}" type="datetimeFigureOut">
               <a:rPr lang="en-US" smtClean="0"/>
-              <a:t>6/29/2018</a:t>
+              <a:t>7/7/2018</a:t>
             </a:fld>
             <a:endParaRPr lang="en-US"/>
           </a:p>
@@ -2073,7 +2251,7 @@
           <a:p>
             <a:fld id="{43C54877-A7F5-454C-8E09-C7623D142609}" type="datetimeFigureOut">
               <a:rPr lang="en-US" smtClean="0"/>
-              <a:t>6/29/2018</a:t>
+              <a:t>7/7/2018</a:t>
             </a:fld>
             <a:endParaRPr lang="en-US"/>
           </a:p>
@@ -2384,7 +2562,7 @@
           <a:p>
             <a:fld id="{43C54877-A7F5-454C-8E09-C7623D142609}" type="datetimeFigureOut">
               <a:rPr lang="en-US" smtClean="0"/>
-              <a:t>6/29/2018</a:t>
+              <a:t>7/7/2018</a:t>
             </a:fld>
             <a:endParaRPr lang="en-US"/>
           </a:p>
@@ -2672,7 +2850,7 @@
           <a:p>
             <a:fld id="{43C54877-A7F5-454C-8E09-C7623D142609}" type="datetimeFigureOut">
               <a:rPr lang="en-US" smtClean="0"/>
-              <a:t>6/29/2018</a:t>
+              <a:t>7/7/2018</a:t>
             </a:fld>
             <a:endParaRPr lang="en-US"/>
           </a:p>
@@ -2913,7 +3091,7 @@
           <a:p>
             <a:fld id="{43C54877-A7F5-454C-8E09-C7623D142609}" type="datetimeFigureOut">
               <a:rPr lang="en-US" smtClean="0"/>
-              <a:t>6/29/2018</a:t>
+              <a:t>7/7/2018</a:t>
             </a:fld>
             <a:endParaRPr lang="en-US"/>
           </a:p>
@@ -3923,10 +4101,10 @@
       </p:grpSpPr>
       <p:pic>
         <p:nvPicPr>
-          <p:cNvPr id="46" name="Picture 45">
-            <a:extLst>
-              <a:ext uri="{FF2B5EF4-FFF2-40B4-BE49-F238E27FC236}">
-                <a16:creationId xmlns:a16="http://schemas.microsoft.com/office/drawing/2014/main" id="{2B1844E2-A67F-4B28-B1D4-F998E8DAAE5C}"/>
+          <p:cNvPr id="3" name="Picture 2">
+            <a:extLst>
+              <a:ext uri="{FF2B5EF4-FFF2-40B4-BE49-F238E27FC236}">
+                <a16:creationId xmlns:a16="http://schemas.microsoft.com/office/drawing/2014/main" id="{F3AC5A7D-FE77-4734-8A65-3D7B56FC663C}"/>
               </a:ext>
             </a:extLst>
           </p:cNvPr>
@@ -3936,7 +4114,43 @@
           <p:nvPr/>
         </p:nvPicPr>
         <p:blipFill>
-          <a:blip r:embed="rId2"/>
+          <a:blip r:embed="rId2">
+            <a:extLst>
+              <a:ext uri="{28A0092B-C50C-407E-A947-70E740481C1C}">
+                <a14:useLocalDpi xmlns:a14="http://schemas.microsoft.com/office/drawing/2010/main" val="0"/>
+              </a:ext>
+            </a:extLst>
+          </a:blip>
+          <a:stretch>
+            <a:fillRect/>
+          </a:stretch>
+        </p:blipFill>
+        <p:spPr>
+          <a:xfrm>
+            <a:off x="91387" y="2748238"/>
+            <a:ext cx="2562180" cy="1440000"/>
+          </a:xfrm>
+          <a:prstGeom prst="rect">
+            <a:avLst/>
+          </a:prstGeom>
+        </p:spPr>
+      </p:pic>
+      <p:pic>
+        <p:nvPicPr>
+          <p:cNvPr id="46" name="Picture 45">
+            <a:extLst>
+              <a:ext uri="{FF2B5EF4-FFF2-40B4-BE49-F238E27FC236}">
+                <a16:creationId xmlns:a16="http://schemas.microsoft.com/office/drawing/2014/main" id="{2B1844E2-A67F-4B28-B1D4-F998E8DAAE5C}"/>
+              </a:ext>
+            </a:extLst>
+          </p:cNvPr>
+          <p:cNvPicPr>
+            <a:picLocks noChangeAspect="1"/>
+          </p:cNvPicPr>
+          <p:nvPr/>
+        </p:nvPicPr>
+        <p:blipFill>
+          <a:blip r:embed="rId3"/>
           <a:stretch>
             <a:fillRect/>
           </a:stretch>
@@ -3949,49 +4163,6 @@
           <a:prstGeom prst="rect">
             <a:avLst/>
           </a:prstGeom>
-        </p:spPr>
-      </p:pic>
-      <p:pic>
-        <p:nvPicPr>
-          <p:cNvPr id="27" name="Picture 26">
-            <a:extLst>
-              <a:ext uri="{FF2B5EF4-FFF2-40B4-BE49-F238E27FC236}">
-                <a16:creationId xmlns:a16="http://schemas.microsoft.com/office/drawing/2014/main" id="{6D90026A-E699-42CB-86E6-620F6FD4662A}"/>
-              </a:ext>
-            </a:extLst>
-          </p:cNvPr>
-          <p:cNvPicPr>
-            <a:picLocks noChangeAspect="1"/>
-          </p:cNvPicPr>
-          <p:nvPr/>
-        </p:nvPicPr>
-        <p:blipFill>
-          <a:blip r:embed="rId3">
-            <a:extLst>
-              <a:ext uri="{28A0092B-C50C-407E-A947-70E740481C1C}">
-                <a14:useLocalDpi xmlns:a14="http://schemas.microsoft.com/office/drawing/2010/main" val="0"/>
-              </a:ext>
-            </a:extLst>
-          </a:blip>
-          <a:stretch>
-            <a:fillRect/>
-          </a:stretch>
-        </p:blipFill>
-        <p:spPr>
-          <a:xfrm>
-            <a:off x="91387" y="2749324"/>
-            <a:ext cx="2562180" cy="1440000"/>
-          </a:xfrm>
-          <a:prstGeom prst="rect">
-            <a:avLst/>
-          </a:prstGeom>
-          <a:ln w="6350">
-            <a:solidFill>
-              <a:schemeClr val="bg1">
-                <a:lumMod val="50000"/>
-              </a:schemeClr>
-            </a:solidFill>
-          </a:ln>
         </p:spPr>
       </p:pic>
       <p:cxnSp>
@@ -4118,10 +4289,10 @@
       </p:grpSpPr>
       <p:pic>
         <p:nvPicPr>
-          <p:cNvPr id="5" name="Picture 4">
-            <a:extLst>
-              <a:ext uri="{FF2B5EF4-FFF2-40B4-BE49-F238E27FC236}">
-                <a16:creationId xmlns:a16="http://schemas.microsoft.com/office/drawing/2014/main" id="{A9917661-DD47-499D-ADA3-09FB9CEFD0B6}"/>
+          <p:cNvPr id="6" name="Picture 5">
+            <a:extLst>
+              <a:ext uri="{FF2B5EF4-FFF2-40B4-BE49-F238E27FC236}">
+                <a16:creationId xmlns:a16="http://schemas.microsoft.com/office/drawing/2014/main" id="{4DB42CF9-A830-446A-9AE7-4EBBAA7F4FA3}"/>
               </a:ext>
             </a:extLst>
           </p:cNvPr>
@@ -4131,7 +4302,43 @@
           <p:nvPr/>
         </p:nvPicPr>
         <p:blipFill>
-          <a:blip r:embed="rId2"/>
+          <a:blip r:embed="rId2">
+            <a:extLst>
+              <a:ext uri="{28A0092B-C50C-407E-A947-70E740481C1C}">
+                <a14:useLocalDpi xmlns:a14="http://schemas.microsoft.com/office/drawing/2010/main" val="0"/>
+              </a:ext>
+            </a:extLst>
+          </a:blip>
+          <a:stretch>
+            <a:fillRect/>
+          </a:stretch>
+        </p:blipFill>
+        <p:spPr>
+          <a:xfrm>
+            <a:off x="97016" y="2743043"/>
+            <a:ext cx="2562180" cy="1440000"/>
+          </a:xfrm>
+          <a:prstGeom prst="rect">
+            <a:avLst/>
+          </a:prstGeom>
+        </p:spPr>
+      </p:pic>
+      <p:pic>
+        <p:nvPicPr>
+          <p:cNvPr id="5" name="Picture 4">
+            <a:extLst>
+              <a:ext uri="{FF2B5EF4-FFF2-40B4-BE49-F238E27FC236}">
+                <a16:creationId xmlns:a16="http://schemas.microsoft.com/office/drawing/2014/main" id="{A9917661-DD47-499D-ADA3-09FB9CEFD0B6}"/>
+              </a:ext>
+            </a:extLst>
+          </p:cNvPr>
+          <p:cNvPicPr>
+            <a:picLocks noChangeAspect="1"/>
+          </p:cNvPicPr>
+          <p:nvPr/>
+        </p:nvPicPr>
+        <p:blipFill>
+          <a:blip r:embed="rId3"/>
           <a:stretch>
             <a:fillRect/>
           </a:stretch>
@@ -4144,49 +4351,6 @@
           <a:prstGeom prst="rect">
             <a:avLst/>
           </a:prstGeom>
-        </p:spPr>
-      </p:pic>
-      <p:pic>
-        <p:nvPicPr>
-          <p:cNvPr id="3" name="Picture 2">
-            <a:extLst>
-              <a:ext uri="{FF2B5EF4-FFF2-40B4-BE49-F238E27FC236}">
-                <a16:creationId xmlns:a16="http://schemas.microsoft.com/office/drawing/2014/main" id="{1D251076-4C18-4EC3-8B0A-2FE421E96E3E}"/>
-              </a:ext>
-            </a:extLst>
-          </p:cNvPr>
-          <p:cNvPicPr>
-            <a:picLocks noChangeAspect="1"/>
-          </p:cNvPicPr>
-          <p:nvPr/>
-        </p:nvPicPr>
-        <p:blipFill>
-          <a:blip r:embed="rId3">
-            <a:extLst>
-              <a:ext uri="{28A0092B-C50C-407E-A947-70E740481C1C}">
-                <a14:useLocalDpi xmlns:a14="http://schemas.microsoft.com/office/drawing/2010/main" val="0"/>
-              </a:ext>
-            </a:extLst>
-          </a:blip>
-          <a:stretch>
-            <a:fillRect/>
-          </a:stretch>
-        </p:blipFill>
-        <p:spPr>
-          <a:xfrm>
-            <a:off x="65970" y="2756904"/>
-            <a:ext cx="2562180" cy="1440000"/>
-          </a:xfrm>
-          <a:prstGeom prst="rect">
-            <a:avLst/>
-          </a:prstGeom>
-          <a:ln w="6350">
-            <a:solidFill>
-              <a:schemeClr val="bg1">
-                <a:lumMod val="50000"/>
-              </a:schemeClr>
-            </a:solidFill>
-          </a:ln>
         </p:spPr>
       </p:pic>
       <p:cxnSp>
@@ -4313,10 +4477,10 @@
       </p:grpSpPr>
       <p:pic>
         <p:nvPicPr>
-          <p:cNvPr id="6" name="Picture 5">
-            <a:extLst>
-              <a:ext uri="{FF2B5EF4-FFF2-40B4-BE49-F238E27FC236}">
-                <a16:creationId xmlns:a16="http://schemas.microsoft.com/office/drawing/2014/main" id="{0CF2E5D3-CB70-4025-8642-37A6C1632E3E}"/>
+          <p:cNvPr id="4" name="Picture 3">
+            <a:extLst>
+              <a:ext uri="{FF2B5EF4-FFF2-40B4-BE49-F238E27FC236}">
+                <a16:creationId xmlns:a16="http://schemas.microsoft.com/office/drawing/2014/main" id="{7D211156-A236-47C8-A6E0-C31E5B960D5B}"/>
               </a:ext>
             </a:extLst>
           </p:cNvPr>
@@ -4326,37 +4490,7 @@
           <p:nvPr/>
         </p:nvPicPr>
         <p:blipFill>
-          <a:blip r:embed="rId2"/>
-          <a:stretch>
-            <a:fillRect/>
-          </a:stretch>
-        </p:blipFill>
-        <p:spPr>
-          <a:xfrm>
-            <a:off x="3162144" y="1765087"/>
-            <a:ext cx="6809822" cy="3444539"/>
-          </a:xfrm>
-          <a:prstGeom prst="rect">
-            <a:avLst/>
-          </a:prstGeom>
-        </p:spPr>
-      </p:pic>
-      <p:pic>
-        <p:nvPicPr>
-          <p:cNvPr id="3" name="Picture 2">
-            <a:extLst>
-              <a:ext uri="{FF2B5EF4-FFF2-40B4-BE49-F238E27FC236}">
-                <a16:creationId xmlns:a16="http://schemas.microsoft.com/office/drawing/2014/main" id="{02A2988B-A9A1-4989-983B-5C044E548A10}"/>
-              </a:ext>
-            </a:extLst>
-          </p:cNvPr>
-          <p:cNvPicPr>
-            <a:picLocks noChangeAspect="1"/>
-          </p:cNvPicPr>
-          <p:nvPr/>
-        </p:nvPicPr>
-        <p:blipFill>
-          <a:blip r:embed="rId3">
+          <a:blip r:embed="rId2">
             <a:extLst>
               <a:ext uri="{28A0092B-C50C-407E-A947-70E740481C1C}">
                 <a14:useLocalDpi xmlns:a14="http://schemas.microsoft.com/office/drawing/2010/main" val="0"/>
@@ -4375,13 +4509,36 @@
           <a:prstGeom prst="rect">
             <a:avLst/>
           </a:prstGeom>
-          <a:ln w="6350">
-            <a:solidFill>
-              <a:schemeClr val="bg1">
-                <a:lumMod val="50000"/>
-              </a:schemeClr>
-            </a:solidFill>
-          </a:ln>
+        </p:spPr>
+      </p:pic>
+      <p:pic>
+        <p:nvPicPr>
+          <p:cNvPr id="6" name="Picture 5">
+            <a:extLst>
+              <a:ext uri="{FF2B5EF4-FFF2-40B4-BE49-F238E27FC236}">
+                <a16:creationId xmlns:a16="http://schemas.microsoft.com/office/drawing/2014/main" id="{0CF2E5D3-CB70-4025-8642-37A6C1632E3E}"/>
+              </a:ext>
+            </a:extLst>
+          </p:cNvPr>
+          <p:cNvPicPr>
+            <a:picLocks noChangeAspect="1"/>
+          </p:cNvPicPr>
+          <p:nvPr/>
+        </p:nvPicPr>
+        <p:blipFill>
+          <a:blip r:embed="rId3"/>
+          <a:stretch>
+            <a:fillRect/>
+          </a:stretch>
+        </p:blipFill>
+        <p:spPr>
+          <a:xfrm>
+            <a:off x="3162144" y="1765087"/>
+            <a:ext cx="6809822" cy="3444539"/>
+          </a:xfrm>
+          <a:prstGeom prst="rect">
+            <a:avLst/>
+          </a:prstGeom>
         </p:spPr>
       </p:pic>
       <p:cxnSp>
@@ -4508,10 +4665,10 @@
       </p:grpSpPr>
       <p:pic>
         <p:nvPicPr>
-          <p:cNvPr id="6" name="Picture 5">
-            <a:extLst>
-              <a:ext uri="{FF2B5EF4-FFF2-40B4-BE49-F238E27FC236}">
-                <a16:creationId xmlns:a16="http://schemas.microsoft.com/office/drawing/2014/main" id="{A580A17A-68E5-438C-B457-EAA937FD82B9}"/>
+          <p:cNvPr id="4" name="Picture 3">
+            <a:extLst>
+              <a:ext uri="{FF2B5EF4-FFF2-40B4-BE49-F238E27FC236}">
+                <a16:creationId xmlns:a16="http://schemas.microsoft.com/office/drawing/2014/main" id="{0D1E4CE5-A32E-4EBC-9FC1-EEDBF01969AE}"/>
               </a:ext>
             </a:extLst>
           </p:cNvPr>
@@ -4521,7 +4678,43 @@
           <p:nvPr/>
         </p:nvPicPr>
         <p:blipFill>
-          <a:blip r:embed="rId2"/>
+          <a:blip r:embed="rId2">
+            <a:extLst>
+              <a:ext uri="{28A0092B-C50C-407E-A947-70E740481C1C}">
+                <a14:useLocalDpi xmlns:a14="http://schemas.microsoft.com/office/drawing/2010/main" val="0"/>
+              </a:ext>
+            </a:extLst>
+          </a:blip>
+          <a:stretch>
+            <a:fillRect/>
+          </a:stretch>
+        </p:blipFill>
+        <p:spPr>
+          <a:xfrm>
+            <a:off x="88741" y="2747573"/>
+            <a:ext cx="2562180" cy="1440000"/>
+          </a:xfrm>
+          <a:prstGeom prst="rect">
+            <a:avLst/>
+          </a:prstGeom>
+        </p:spPr>
+      </p:pic>
+      <p:pic>
+        <p:nvPicPr>
+          <p:cNvPr id="6" name="Picture 5">
+            <a:extLst>
+              <a:ext uri="{FF2B5EF4-FFF2-40B4-BE49-F238E27FC236}">
+                <a16:creationId xmlns:a16="http://schemas.microsoft.com/office/drawing/2014/main" id="{A580A17A-68E5-438C-B457-EAA937FD82B9}"/>
+              </a:ext>
+            </a:extLst>
+          </p:cNvPr>
+          <p:cNvPicPr>
+            <a:picLocks noChangeAspect="1"/>
+          </p:cNvPicPr>
+          <p:nvPr/>
+        </p:nvPicPr>
+        <p:blipFill>
+          <a:blip r:embed="rId3"/>
           <a:stretch>
             <a:fillRect/>
           </a:stretch>
@@ -4534,49 +4727,6 @@
           <a:prstGeom prst="rect">
             <a:avLst/>
           </a:prstGeom>
-        </p:spPr>
-      </p:pic>
-      <p:pic>
-        <p:nvPicPr>
-          <p:cNvPr id="3" name="Picture 2">
-            <a:extLst>
-              <a:ext uri="{FF2B5EF4-FFF2-40B4-BE49-F238E27FC236}">
-                <a16:creationId xmlns:a16="http://schemas.microsoft.com/office/drawing/2014/main" id="{81F9BA15-B68B-4F43-B052-ED817346D4AE}"/>
-              </a:ext>
-            </a:extLst>
-          </p:cNvPr>
-          <p:cNvPicPr>
-            <a:picLocks noChangeAspect="1"/>
-          </p:cNvPicPr>
-          <p:nvPr/>
-        </p:nvPicPr>
-        <p:blipFill>
-          <a:blip r:embed="rId3">
-            <a:extLst>
-              <a:ext uri="{28A0092B-C50C-407E-A947-70E740481C1C}">
-                <a14:useLocalDpi xmlns:a14="http://schemas.microsoft.com/office/drawing/2010/main" val="0"/>
-              </a:ext>
-            </a:extLst>
-          </a:blip>
-          <a:stretch>
-            <a:fillRect/>
-          </a:stretch>
-        </p:blipFill>
-        <p:spPr>
-          <a:xfrm>
-            <a:off x="100896" y="2747573"/>
-            <a:ext cx="2562180" cy="1440000"/>
-          </a:xfrm>
-          <a:prstGeom prst="rect">
-            <a:avLst/>
-          </a:prstGeom>
-          <a:ln w="6350">
-            <a:solidFill>
-              <a:schemeClr val="bg1">
-                <a:lumMod val="50000"/>
-              </a:schemeClr>
-            </a:solidFill>
-          </a:ln>
         </p:spPr>
       </p:pic>
       <p:cxnSp>
@@ -4995,6 +5145,216 @@
     <p:extLst>
       <p:ext uri="{BB962C8B-B14F-4D97-AF65-F5344CB8AC3E}">
         <p14:creationId xmlns:p14="http://schemas.microsoft.com/office/powerpoint/2010/main" val="2150016624"/>
+      </p:ext>
+    </p:extLst>
+  </p:cSld>
+  <p:clrMapOvr>
+    <a:masterClrMapping/>
+  </p:clrMapOvr>
+</p:sld>
+</file>
+
+<file path=ppt/slides/slide6.xml><?xml version="1.0" encoding="utf-8"?>
+<p:sld xmlns:a="http://schemas.openxmlformats.org/drawingml/2006/main" xmlns:r="http://schemas.openxmlformats.org/officeDocument/2006/relationships" xmlns:p="http://schemas.openxmlformats.org/presentationml/2006/main">
+  <p:cSld>
+    <p:bg>
+      <p:bgPr>
+        <a:solidFill>
+          <a:schemeClr val="bg1"/>
+        </a:solidFill>
+        <a:effectLst/>
+      </p:bgPr>
+    </p:bg>
+    <p:spTree>
+      <p:nvGrpSpPr>
+        <p:cNvPr id="1" name=""/>
+        <p:cNvGrpSpPr/>
+        <p:nvPr/>
+      </p:nvGrpSpPr>
+      <p:grpSpPr>
+        <a:xfrm>
+          <a:off x="0" y="0"/>
+          <a:ext cx="0" cy="0"/>
+          <a:chOff x="0" y="0"/>
+          <a:chExt cx="0" cy="0"/>
+        </a:xfrm>
+      </p:grpSpPr>
+      <p:sp>
+        <p:nvSpPr>
+          <p:cNvPr id="13" name="Rectangle 8">
+            <a:extLst>
+              <a:ext uri="{FF2B5EF4-FFF2-40B4-BE49-F238E27FC236}">
+                <a16:creationId xmlns:a16="http://schemas.microsoft.com/office/drawing/2014/main" id="{01D0AF59-99C3-4251-AB9A-C966C6AD4400}"/>
+              </a:ext>
+              <a:ext uri="{C183D7F6-B498-43B3-948B-1728B52AA6E4}">
+                <adec:decorative xmlns:adec="http://schemas.microsoft.com/office/drawing/2017/decorative" val="1"/>
+              </a:ext>
+            </a:extLst>
+          </p:cNvPr>
+          <p:cNvSpPr>
+            <a:spLocks noGrp="1" noRot="1" noChangeAspect="1" noMove="1" noResize="1" noEditPoints="1" noAdjustHandles="1" noChangeArrowheads="1" noChangeShapeType="1" noTextEdit="1"/>
+          </p:cNvSpPr>
+          <p:nvPr>
+            <p:extLst>
+              <p:ext uri="{386F3935-93C4-4BCD-93E2-E3B085C9AB24}">
+                <p16:designElem xmlns:p16="http://schemas.microsoft.com/office/powerpoint/2015/main" val="1"/>
+              </p:ext>
+            </p:extLst>
+          </p:nvPr>
+        </p:nvSpPr>
+        <p:spPr>
+          <a:xfrm>
+            <a:off x="0" y="0"/>
+            <a:ext cx="12192000" cy="6858000"/>
+          </a:xfrm>
+          <a:prstGeom prst="rect">
+            <a:avLst/>
+          </a:prstGeom>
+          <a:solidFill>
+            <a:schemeClr val="bg2"/>
+          </a:solidFill>
+          <a:ln>
+            <a:noFill/>
+          </a:ln>
+        </p:spPr>
+        <p:style>
+          <a:lnRef idx="2">
+            <a:schemeClr val="accent1">
+              <a:shade val="50000"/>
+            </a:schemeClr>
+          </a:lnRef>
+          <a:fillRef idx="1">
+            <a:schemeClr val="accent1"/>
+          </a:fillRef>
+          <a:effectRef idx="0">
+            <a:schemeClr val="accent1"/>
+          </a:effectRef>
+          <a:fontRef idx="minor">
+            <a:schemeClr val="lt1"/>
+          </a:fontRef>
+        </p:style>
+        <p:txBody>
+          <a:bodyPr rtlCol="0" anchor="ctr"/>
+          <a:lstStyle/>
+          <a:p>
+            <a:pPr algn="ctr"/>
+            <a:endParaRPr lang="en-US"/>
+          </a:p>
+        </p:txBody>
+      </p:sp>
+      <p:sp>
+        <p:nvSpPr>
+          <p:cNvPr id="14" name="Rectangle 10">
+            <a:extLst>
+              <a:ext uri="{FF2B5EF4-FFF2-40B4-BE49-F238E27FC236}">
+                <a16:creationId xmlns:a16="http://schemas.microsoft.com/office/drawing/2014/main" id="{1855405F-37A2-4869-9154-F8BE3BECE6C3}"/>
+              </a:ext>
+              <a:ext uri="{C183D7F6-B498-43B3-948B-1728B52AA6E4}">
+                <adec:decorative xmlns:adec="http://schemas.microsoft.com/office/drawing/2017/decorative" val="1"/>
+              </a:ext>
+            </a:extLst>
+          </p:cNvPr>
+          <p:cNvSpPr>
+            <a:spLocks noGrp="1" noRot="1" noChangeAspect="1" noMove="1" noResize="1" noEditPoints="1" noAdjustHandles="1" noChangeArrowheads="1" noChangeShapeType="1" noTextEdit="1"/>
+          </p:cNvSpPr>
+          <p:nvPr>
+            <p:extLst>
+              <p:ext uri="{386F3935-93C4-4BCD-93E2-E3B085C9AB24}">
+                <p16:designElem xmlns:p16="http://schemas.microsoft.com/office/powerpoint/2015/main" val="1"/>
+              </p:ext>
+            </p:extLst>
+          </p:nvPr>
+        </p:nvSpPr>
+        <p:spPr>
+          <a:xfrm>
+            <a:off x="477012" y="480060"/>
+            <a:ext cx="11237976" cy="5897880"/>
+          </a:xfrm>
+          <a:prstGeom prst="rect">
+            <a:avLst/>
+          </a:prstGeom>
+          <a:solidFill>
+            <a:srgbClr val="FFFFFF"/>
+          </a:solidFill>
+          <a:ln w="9525">
+            <a:noFill/>
+          </a:ln>
+          <a:effectLst>
+            <a:outerShdw blurRad="63500" dist="17780" dir="5400000" algn="t" rotWithShape="0">
+              <a:prstClr val="black">
+                <a:alpha val="43000"/>
+              </a:prstClr>
+            </a:outerShdw>
+          </a:effectLst>
+        </p:spPr>
+        <p:style>
+          <a:lnRef idx="2">
+            <a:schemeClr val="accent1">
+              <a:shade val="50000"/>
+            </a:schemeClr>
+          </a:lnRef>
+          <a:fillRef idx="1">
+            <a:schemeClr val="accent1"/>
+          </a:fillRef>
+          <a:effectRef idx="0">
+            <a:schemeClr val="accent1"/>
+          </a:effectRef>
+          <a:fontRef idx="minor">
+            <a:schemeClr val="lt1"/>
+          </a:fontRef>
+        </p:style>
+        <p:txBody>
+          <a:bodyPr rtlCol="0" anchor="ctr"/>
+          <a:lstStyle/>
+          <a:p>
+            <a:pPr algn="ctr"/>
+            <a:endParaRPr lang="en-US"/>
+          </a:p>
+        </p:txBody>
+      </p:sp>
+      <p:pic>
+        <p:nvPicPr>
+          <p:cNvPr id="3" name="Picture 2">
+            <a:extLst>
+              <a:ext uri="{FF2B5EF4-FFF2-40B4-BE49-F238E27FC236}">
+                <a16:creationId xmlns:a16="http://schemas.microsoft.com/office/drawing/2014/main" id="{571D036B-EF27-4899-8BF2-528FF9BDCC0B}"/>
+              </a:ext>
+            </a:extLst>
+          </p:cNvPr>
+          <p:cNvPicPr>
+            <a:picLocks noChangeAspect="1"/>
+          </p:cNvPicPr>
+          <p:nvPr/>
+        </p:nvPicPr>
+        <p:blipFill>
+          <a:blip r:embed="rId2">
+            <a:extLst>
+              <a:ext uri="{28A0092B-C50C-407E-A947-70E740481C1C}">
+                <a14:useLocalDpi xmlns:a14="http://schemas.microsoft.com/office/drawing/2010/main" val="0"/>
+              </a:ext>
+              <a:ext uri="{837473B0-CC2E-450A-ABE3-18F120FF3D39}">
+                <a1611:picAttrSrcUrl xmlns:a1611="http://schemas.microsoft.com/office/drawing/2016/11/main" r:id="rId3"/>
+              </a:ext>
+            </a:extLst>
+          </a:blip>
+          <a:stretch>
+            <a:fillRect/>
+          </a:stretch>
+        </p:blipFill>
+        <p:spPr>
+          <a:xfrm>
+            <a:off x="2029528" y="643467"/>
+            <a:ext cx="8132943" cy="5571066"/>
+          </a:xfrm>
+          <a:prstGeom prst="rect">
+            <a:avLst/>
+          </a:prstGeom>
+        </p:spPr>
+      </p:pic>
+    </p:spTree>
+    <p:extLst>
+      <p:ext uri="{BB962C8B-B14F-4D97-AF65-F5344CB8AC3E}">
+        <p14:creationId xmlns:p14="http://schemas.microsoft.com/office/powerpoint/2010/main" val="2768809047"/>
       </p:ext>
     </p:extLst>
   </p:cSld>

</xml_diff>

<commit_message>
Change colour of posters  in article. (#16)
</commit_message>
<xml_diff>
--- a/src/articles/devops-mindset-essentials.pptx
+++ b/src/articles/devops-mindset-essentials.pptx
@@ -10,6 +10,7 @@
     <p:sldId id="259" r:id="rId4"/>
     <p:sldId id="260" r:id="rId5"/>
     <p:sldId id="261" r:id="rId6"/>
+    <p:sldId id="262" r:id="rId7"/>
   </p:sldIdLst>
   <p:sldSz cx="12192000" cy="6858000"/>
   <p:notesSz cx="6858000" cy="9144000"/>
@@ -116,6 +117,183 @@
 </p:presentation>
 </file>
 
+<file path=ppt/revisionInfo.xml><?xml version="1.0" encoding="utf-8"?>
+<p1510:revInfo xmlns:a="http://schemas.openxmlformats.org/drawingml/2006/main" xmlns:r="http://schemas.openxmlformats.org/officeDocument/2006/relationships" xmlns:p1510="http://schemas.microsoft.com/office/powerpoint/2015/10/main">
+  <p1510:revLst>
+    <p1510:client id="{7680898E-CD27-4509-96F4-1C2ED3879AF2}" v="31" dt="2018-07-07T17:15:28.927"/>
+  </p1510:revLst>
+</p1510:revInfo>
+</file>
+
+<file path=ppt/changesInfos/changesInfo1.xml><?xml version="1.0" encoding="utf-8"?>
+<pc:chgInfo xmlns:a="http://schemas.openxmlformats.org/drawingml/2006/main" xmlns:r="http://schemas.openxmlformats.org/officeDocument/2006/relationships" xmlns:ac="http://schemas.microsoft.com/office/drawing/2013/main/command" xmlns:pc="http://schemas.microsoft.com/office/powerpoint/2013/main/command">
+  <pc:docChgLst>
+    <pc:chgData userId="707b42e47e16ca84" providerId="LiveId" clId="{7680898E-CD27-4509-96F4-1C2ED3879AF2}"/>
+    <pc:docChg chg="undo custSel mod addSld modSld">
+      <pc:chgData name="" userId="707b42e47e16ca84" providerId="LiveId" clId="{7680898E-CD27-4509-96F4-1C2ED3879AF2}" dt="2018-07-07T17:15:28.927" v="29" actId="478"/>
+      <pc:docMkLst>
+        <pc:docMk/>
+      </pc:docMkLst>
+      <pc:sldChg chg="addSp delSp modSp">
+        <pc:chgData name="" userId="707b42e47e16ca84" providerId="LiveId" clId="{7680898E-CD27-4509-96F4-1C2ED3879AF2}" dt="2018-07-07T17:02:46.698" v="4" actId="478"/>
+        <pc:sldMkLst>
+          <pc:docMk/>
+          <pc:sldMk cId="1856713462" sldId="257"/>
+        </pc:sldMkLst>
+        <pc:picChg chg="add mod ord">
+          <ac:chgData name="" userId="707b42e47e16ca84" providerId="LiveId" clId="{7680898E-CD27-4509-96F4-1C2ED3879AF2}" dt="2018-07-07T17:02:45.157" v="3" actId="167"/>
+          <ac:picMkLst>
+            <pc:docMk/>
+            <pc:sldMk cId="1856713462" sldId="257"/>
+            <ac:picMk id="3" creationId="{F3AC5A7D-FE77-4734-8A65-3D7B56FC663C}"/>
+          </ac:picMkLst>
+        </pc:picChg>
+        <pc:picChg chg="del">
+          <ac:chgData name="" userId="707b42e47e16ca84" providerId="LiveId" clId="{7680898E-CD27-4509-96F4-1C2ED3879AF2}" dt="2018-07-07T17:02:46.698" v="4" actId="478"/>
+          <ac:picMkLst>
+            <pc:docMk/>
+            <pc:sldMk cId="1856713462" sldId="257"/>
+            <ac:picMk id="27" creationId="{6D90026A-E699-42CB-86E6-620F6FD4662A}"/>
+          </ac:picMkLst>
+        </pc:picChg>
+      </pc:sldChg>
+      <pc:sldChg chg="addSp delSp modSp">
+        <pc:chgData name="" userId="707b42e47e16ca84" providerId="LiveId" clId="{7680898E-CD27-4509-96F4-1C2ED3879AF2}" dt="2018-07-07T17:03:09.375" v="11" actId="478"/>
+        <pc:sldMkLst>
+          <pc:docMk/>
+          <pc:sldMk cId="1272186810" sldId="259"/>
+        </pc:sldMkLst>
+        <pc:graphicFrameChg chg="add del mod">
+          <ac:chgData name="" userId="707b42e47e16ca84" providerId="LiveId" clId="{7680898E-CD27-4509-96F4-1C2ED3879AF2}" dt="2018-07-07T17:02:55.799" v="6" actId="478"/>
+          <ac:graphicFrameMkLst>
+            <pc:docMk/>
+            <pc:sldMk cId="1272186810" sldId="259"/>
+            <ac:graphicFrameMk id="2" creationId="{ADE7A06E-0637-4B41-A1D6-328B44C2A16A}"/>
+          </ac:graphicFrameMkLst>
+        </pc:graphicFrameChg>
+        <pc:picChg chg="del">
+          <ac:chgData name="" userId="707b42e47e16ca84" providerId="LiveId" clId="{7680898E-CD27-4509-96F4-1C2ED3879AF2}" dt="2018-07-07T17:03:09.375" v="11" actId="478"/>
+          <ac:picMkLst>
+            <pc:docMk/>
+            <pc:sldMk cId="1272186810" sldId="259"/>
+            <ac:picMk id="3" creationId="{1D251076-4C18-4EC3-8B0A-2FE421E96E3E}"/>
+          </ac:picMkLst>
+        </pc:picChg>
+        <pc:picChg chg="add mod ord">
+          <ac:chgData name="" userId="707b42e47e16ca84" providerId="LiveId" clId="{7680898E-CD27-4509-96F4-1C2ED3879AF2}" dt="2018-07-07T17:03:07.625" v="10" actId="167"/>
+          <ac:picMkLst>
+            <pc:docMk/>
+            <pc:sldMk cId="1272186810" sldId="259"/>
+            <ac:picMk id="6" creationId="{4DB42CF9-A830-446A-9AE7-4EBBAA7F4FA3}"/>
+          </ac:picMkLst>
+        </pc:picChg>
+      </pc:sldChg>
+      <pc:sldChg chg="addSp delSp modSp">
+        <pc:chgData name="" userId="707b42e47e16ca84" providerId="LiveId" clId="{7680898E-CD27-4509-96F4-1C2ED3879AF2}" dt="2018-07-07T17:03:29.564" v="16" actId="478"/>
+        <pc:sldMkLst>
+          <pc:docMk/>
+          <pc:sldMk cId="2712533191" sldId="260"/>
+        </pc:sldMkLst>
+        <pc:picChg chg="del">
+          <ac:chgData name="" userId="707b42e47e16ca84" providerId="LiveId" clId="{7680898E-CD27-4509-96F4-1C2ED3879AF2}" dt="2018-07-07T17:03:29.564" v="16" actId="478"/>
+          <ac:picMkLst>
+            <pc:docMk/>
+            <pc:sldMk cId="2712533191" sldId="260"/>
+            <ac:picMk id="3" creationId="{02A2988B-A9A1-4989-983B-5C044E548A10}"/>
+          </ac:picMkLst>
+        </pc:picChg>
+        <pc:picChg chg="add mod ord">
+          <ac:chgData name="" userId="707b42e47e16ca84" providerId="LiveId" clId="{7680898E-CD27-4509-96F4-1C2ED3879AF2}" dt="2018-07-07T17:03:27.971" v="15" actId="167"/>
+          <ac:picMkLst>
+            <pc:docMk/>
+            <pc:sldMk cId="2712533191" sldId="260"/>
+            <ac:picMk id="4" creationId="{7D211156-A236-47C8-A6E0-C31E5B960D5B}"/>
+          </ac:picMkLst>
+        </pc:picChg>
+      </pc:sldChg>
+      <pc:sldChg chg="addSp delSp modSp">
+        <pc:chgData name="" userId="707b42e47e16ca84" providerId="LiveId" clId="{7680898E-CD27-4509-96F4-1C2ED3879AF2}" dt="2018-07-07T17:03:50.007" v="21" actId="478"/>
+        <pc:sldMkLst>
+          <pc:docMk/>
+          <pc:sldMk cId="2150016624" sldId="261"/>
+        </pc:sldMkLst>
+        <pc:picChg chg="del">
+          <ac:chgData name="" userId="707b42e47e16ca84" providerId="LiveId" clId="{7680898E-CD27-4509-96F4-1C2ED3879AF2}" dt="2018-07-07T17:03:50.007" v="21" actId="478"/>
+          <ac:picMkLst>
+            <pc:docMk/>
+            <pc:sldMk cId="2150016624" sldId="261"/>
+            <ac:picMk id="3" creationId="{81F9BA15-B68B-4F43-B052-ED817346D4AE}"/>
+          </ac:picMkLst>
+        </pc:picChg>
+        <pc:picChg chg="add mod ord">
+          <ac:chgData name="" userId="707b42e47e16ca84" providerId="LiveId" clId="{7680898E-CD27-4509-96F4-1C2ED3879AF2}" dt="2018-07-07T17:03:48.064" v="20" actId="167"/>
+          <ac:picMkLst>
+            <pc:docMk/>
+            <pc:sldMk cId="2150016624" sldId="261"/>
+            <ac:picMk id="4" creationId="{0D1E4CE5-A32E-4EBC-9FC1-EEDBF01969AE}"/>
+          </ac:picMkLst>
+        </pc:picChg>
+      </pc:sldChg>
+      <pc:sldChg chg="addSp delSp modSp add mod setBg">
+        <pc:chgData name="" userId="707b42e47e16ca84" providerId="LiveId" clId="{7680898E-CD27-4509-96F4-1C2ED3879AF2}" dt="2018-07-07T17:15:28.927" v="29" actId="478"/>
+        <pc:sldMkLst>
+          <pc:docMk/>
+          <pc:sldMk cId="2768809047" sldId="262"/>
+        </pc:sldMkLst>
+        <pc:spChg chg="add del mod">
+          <ac:chgData name="" userId="707b42e47e16ca84" providerId="LiveId" clId="{7680898E-CD27-4509-96F4-1C2ED3879AF2}" dt="2018-07-07T17:15:28.927" v="29" actId="478"/>
+          <ac:spMkLst>
+            <pc:docMk/>
+            <pc:sldMk cId="2768809047" sldId="262"/>
+            <ac:spMk id="4" creationId="{988B00CB-19AA-472A-A3EB-960DDF967BAF}"/>
+          </ac:spMkLst>
+        </pc:spChg>
+        <pc:spChg chg="add del">
+          <ac:chgData name="" userId="707b42e47e16ca84" providerId="LiveId" clId="{7680898E-CD27-4509-96F4-1C2ED3879AF2}" dt="2018-07-07T17:15:21.949" v="25" actId="26606"/>
+          <ac:spMkLst>
+            <pc:docMk/>
+            <pc:sldMk cId="2768809047" sldId="262"/>
+            <ac:spMk id="9" creationId="{A4D1609B-102A-4C77-86A2-ACB29FB96D59}"/>
+          </ac:spMkLst>
+        </pc:spChg>
+        <pc:spChg chg="add del">
+          <ac:chgData name="" userId="707b42e47e16ca84" providerId="LiveId" clId="{7680898E-CD27-4509-96F4-1C2ED3879AF2}" dt="2018-07-07T17:15:21.949" v="25" actId="26606"/>
+          <ac:spMkLst>
+            <pc:docMk/>
+            <pc:sldMk cId="2768809047" sldId="262"/>
+            <ac:spMk id="11" creationId="{C651F706-C94E-46D4-BAAE-BAFD1AD976FE}"/>
+          </ac:spMkLst>
+        </pc:spChg>
+        <pc:spChg chg="add">
+          <ac:chgData name="" userId="707b42e47e16ca84" providerId="LiveId" clId="{7680898E-CD27-4509-96F4-1C2ED3879AF2}" dt="2018-07-07T17:15:21.966" v="26" actId="26606"/>
+          <ac:spMkLst>
+            <pc:docMk/>
+            <pc:sldMk cId="2768809047" sldId="262"/>
+            <ac:spMk id="13" creationId="{01D0AF59-99C3-4251-AB9A-C966C6AD4400}"/>
+          </ac:spMkLst>
+        </pc:spChg>
+        <pc:spChg chg="add">
+          <ac:chgData name="" userId="707b42e47e16ca84" providerId="LiveId" clId="{7680898E-CD27-4509-96F4-1C2ED3879AF2}" dt="2018-07-07T17:15:21.966" v="26" actId="26606"/>
+          <ac:spMkLst>
+            <pc:docMk/>
+            <pc:sldMk cId="2768809047" sldId="262"/>
+            <ac:spMk id="14" creationId="{1855405F-37A2-4869-9154-F8BE3BECE6C3}"/>
+          </ac:spMkLst>
+        </pc:spChg>
+        <pc:picChg chg="add mod">
+          <ac:chgData name="" userId="707b42e47e16ca84" providerId="LiveId" clId="{7680898E-CD27-4509-96F4-1C2ED3879AF2}" dt="2018-07-07T17:15:21.966" v="26" actId="26606"/>
+          <ac:picMkLst>
+            <pc:docMk/>
+            <pc:sldMk cId="2768809047" sldId="262"/>
+            <ac:picMk id="3" creationId="{571D036B-EF27-4899-8BF2-528FF9BDCC0B}"/>
+          </ac:picMkLst>
+        </pc:picChg>
+      </pc:sldChg>
+    </pc:docChg>
+  </pc:docChgLst>
+</pc:chgInfo>
+</file>
+
 <file path=ppt/slideLayouts/slideLayout1.xml><?xml version="1.0" encoding="utf-8"?>
 <p:sldLayout xmlns:a="http://schemas.openxmlformats.org/drawingml/2006/main" xmlns:r="http://schemas.openxmlformats.org/officeDocument/2006/relationships" xmlns:p="http://schemas.openxmlformats.org/presentationml/2006/main" type="title" preserve="1">
   <p:cSld name="Title Slide">
@@ -263,7 +441,7 @@
           <a:p>
             <a:fld id="{43C54877-A7F5-454C-8E09-C7623D142609}" type="datetimeFigureOut">
               <a:rPr lang="en-US" smtClean="0"/>
-              <a:t>6/29/2018</a:t>
+              <a:t>7/7/2018</a:t>
             </a:fld>
             <a:endParaRPr lang="en-US"/>
           </a:p>
@@ -461,7 +639,7 @@
           <a:p>
             <a:fld id="{43C54877-A7F5-454C-8E09-C7623D142609}" type="datetimeFigureOut">
               <a:rPr lang="en-US" smtClean="0"/>
-              <a:t>6/29/2018</a:t>
+              <a:t>7/7/2018</a:t>
             </a:fld>
             <a:endParaRPr lang="en-US"/>
           </a:p>
@@ -669,7 +847,7 @@
           <a:p>
             <a:fld id="{43C54877-A7F5-454C-8E09-C7623D142609}" type="datetimeFigureOut">
               <a:rPr lang="en-US" smtClean="0"/>
-              <a:t>6/29/2018</a:t>
+              <a:t>7/7/2018</a:t>
             </a:fld>
             <a:endParaRPr lang="en-US"/>
           </a:p>
@@ -867,7 +1045,7 @@
           <a:p>
             <a:fld id="{43C54877-A7F5-454C-8E09-C7623D142609}" type="datetimeFigureOut">
               <a:rPr lang="en-US" smtClean="0"/>
-              <a:t>6/29/2018</a:t>
+              <a:t>7/7/2018</a:t>
             </a:fld>
             <a:endParaRPr lang="en-US"/>
           </a:p>
@@ -1142,7 +1320,7 @@
           <a:p>
             <a:fld id="{43C54877-A7F5-454C-8E09-C7623D142609}" type="datetimeFigureOut">
               <a:rPr lang="en-US" smtClean="0"/>
-              <a:t>6/29/2018</a:t>
+              <a:t>7/7/2018</a:t>
             </a:fld>
             <a:endParaRPr lang="en-US"/>
           </a:p>
@@ -1407,7 +1585,7 @@
           <a:p>
             <a:fld id="{43C54877-A7F5-454C-8E09-C7623D142609}" type="datetimeFigureOut">
               <a:rPr lang="en-US" smtClean="0"/>
-              <a:t>6/29/2018</a:t>
+              <a:t>7/7/2018</a:t>
             </a:fld>
             <a:endParaRPr lang="en-US"/>
           </a:p>
@@ -1819,7 +1997,7 @@
           <a:p>
             <a:fld id="{43C54877-A7F5-454C-8E09-C7623D142609}" type="datetimeFigureOut">
               <a:rPr lang="en-US" smtClean="0"/>
-              <a:t>6/29/2018</a:t>
+              <a:t>7/7/2018</a:t>
             </a:fld>
             <a:endParaRPr lang="en-US"/>
           </a:p>
@@ -1960,7 +2138,7 @@
           <a:p>
             <a:fld id="{43C54877-A7F5-454C-8E09-C7623D142609}" type="datetimeFigureOut">
               <a:rPr lang="en-US" smtClean="0"/>
-              <a:t>6/29/2018</a:t>
+              <a:t>7/7/2018</a:t>
             </a:fld>
             <a:endParaRPr lang="en-US"/>
           </a:p>
@@ -2073,7 +2251,7 @@
           <a:p>
             <a:fld id="{43C54877-A7F5-454C-8E09-C7623D142609}" type="datetimeFigureOut">
               <a:rPr lang="en-US" smtClean="0"/>
-              <a:t>6/29/2018</a:t>
+              <a:t>7/7/2018</a:t>
             </a:fld>
             <a:endParaRPr lang="en-US"/>
           </a:p>
@@ -2384,7 +2562,7 @@
           <a:p>
             <a:fld id="{43C54877-A7F5-454C-8E09-C7623D142609}" type="datetimeFigureOut">
               <a:rPr lang="en-US" smtClean="0"/>
-              <a:t>6/29/2018</a:t>
+              <a:t>7/7/2018</a:t>
             </a:fld>
             <a:endParaRPr lang="en-US"/>
           </a:p>
@@ -2672,7 +2850,7 @@
           <a:p>
             <a:fld id="{43C54877-A7F5-454C-8E09-C7623D142609}" type="datetimeFigureOut">
               <a:rPr lang="en-US" smtClean="0"/>
-              <a:t>6/29/2018</a:t>
+              <a:t>7/7/2018</a:t>
             </a:fld>
             <a:endParaRPr lang="en-US"/>
           </a:p>
@@ -2913,7 +3091,7 @@
           <a:p>
             <a:fld id="{43C54877-A7F5-454C-8E09-C7623D142609}" type="datetimeFigureOut">
               <a:rPr lang="en-US" smtClean="0"/>
-              <a:t>6/29/2018</a:t>
+              <a:t>7/7/2018</a:t>
             </a:fld>
             <a:endParaRPr lang="en-US"/>
           </a:p>
@@ -3923,10 +4101,10 @@
       </p:grpSpPr>
       <p:pic>
         <p:nvPicPr>
-          <p:cNvPr id="46" name="Picture 45">
-            <a:extLst>
-              <a:ext uri="{FF2B5EF4-FFF2-40B4-BE49-F238E27FC236}">
-                <a16:creationId xmlns:a16="http://schemas.microsoft.com/office/drawing/2014/main" id="{2B1844E2-A67F-4B28-B1D4-F998E8DAAE5C}"/>
+          <p:cNvPr id="3" name="Picture 2">
+            <a:extLst>
+              <a:ext uri="{FF2B5EF4-FFF2-40B4-BE49-F238E27FC236}">
+                <a16:creationId xmlns:a16="http://schemas.microsoft.com/office/drawing/2014/main" id="{F3AC5A7D-FE77-4734-8A65-3D7B56FC663C}"/>
               </a:ext>
             </a:extLst>
           </p:cNvPr>
@@ -3936,7 +4114,43 @@
           <p:nvPr/>
         </p:nvPicPr>
         <p:blipFill>
-          <a:blip r:embed="rId2"/>
+          <a:blip r:embed="rId2">
+            <a:extLst>
+              <a:ext uri="{28A0092B-C50C-407E-A947-70E740481C1C}">
+                <a14:useLocalDpi xmlns:a14="http://schemas.microsoft.com/office/drawing/2010/main" val="0"/>
+              </a:ext>
+            </a:extLst>
+          </a:blip>
+          <a:stretch>
+            <a:fillRect/>
+          </a:stretch>
+        </p:blipFill>
+        <p:spPr>
+          <a:xfrm>
+            <a:off x="91387" y="2748238"/>
+            <a:ext cx="2562180" cy="1440000"/>
+          </a:xfrm>
+          <a:prstGeom prst="rect">
+            <a:avLst/>
+          </a:prstGeom>
+        </p:spPr>
+      </p:pic>
+      <p:pic>
+        <p:nvPicPr>
+          <p:cNvPr id="46" name="Picture 45">
+            <a:extLst>
+              <a:ext uri="{FF2B5EF4-FFF2-40B4-BE49-F238E27FC236}">
+                <a16:creationId xmlns:a16="http://schemas.microsoft.com/office/drawing/2014/main" id="{2B1844E2-A67F-4B28-B1D4-F998E8DAAE5C}"/>
+              </a:ext>
+            </a:extLst>
+          </p:cNvPr>
+          <p:cNvPicPr>
+            <a:picLocks noChangeAspect="1"/>
+          </p:cNvPicPr>
+          <p:nvPr/>
+        </p:nvPicPr>
+        <p:blipFill>
+          <a:blip r:embed="rId3"/>
           <a:stretch>
             <a:fillRect/>
           </a:stretch>
@@ -3949,49 +4163,6 @@
           <a:prstGeom prst="rect">
             <a:avLst/>
           </a:prstGeom>
-        </p:spPr>
-      </p:pic>
-      <p:pic>
-        <p:nvPicPr>
-          <p:cNvPr id="27" name="Picture 26">
-            <a:extLst>
-              <a:ext uri="{FF2B5EF4-FFF2-40B4-BE49-F238E27FC236}">
-                <a16:creationId xmlns:a16="http://schemas.microsoft.com/office/drawing/2014/main" id="{6D90026A-E699-42CB-86E6-620F6FD4662A}"/>
-              </a:ext>
-            </a:extLst>
-          </p:cNvPr>
-          <p:cNvPicPr>
-            <a:picLocks noChangeAspect="1"/>
-          </p:cNvPicPr>
-          <p:nvPr/>
-        </p:nvPicPr>
-        <p:blipFill>
-          <a:blip r:embed="rId3">
-            <a:extLst>
-              <a:ext uri="{28A0092B-C50C-407E-A947-70E740481C1C}">
-                <a14:useLocalDpi xmlns:a14="http://schemas.microsoft.com/office/drawing/2010/main" val="0"/>
-              </a:ext>
-            </a:extLst>
-          </a:blip>
-          <a:stretch>
-            <a:fillRect/>
-          </a:stretch>
-        </p:blipFill>
-        <p:spPr>
-          <a:xfrm>
-            <a:off x="91387" y="2749324"/>
-            <a:ext cx="2562180" cy="1440000"/>
-          </a:xfrm>
-          <a:prstGeom prst="rect">
-            <a:avLst/>
-          </a:prstGeom>
-          <a:ln w="6350">
-            <a:solidFill>
-              <a:schemeClr val="bg1">
-                <a:lumMod val="50000"/>
-              </a:schemeClr>
-            </a:solidFill>
-          </a:ln>
         </p:spPr>
       </p:pic>
       <p:cxnSp>
@@ -4118,10 +4289,10 @@
       </p:grpSpPr>
       <p:pic>
         <p:nvPicPr>
-          <p:cNvPr id="5" name="Picture 4">
-            <a:extLst>
-              <a:ext uri="{FF2B5EF4-FFF2-40B4-BE49-F238E27FC236}">
-                <a16:creationId xmlns:a16="http://schemas.microsoft.com/office/drawing/2014/main" id="{A9917661-DD47-499D-ADA3-09FB9CEFD0B6}"/>
+          <p:cNvPr id="6" name="Picture 5">
+            <a:extLst>
+              <a:ext uri="{FF2B5EF4-FFF2-40B4-BE49-F238E27FC236}">
+                <a16:creationId xmlns:a16="http://schemas.microsoft.com/office/drawing/2014/main" id="{4DB42CF9-A830-446A-9AE7-4EBBAA7F4FA3}"/>
               </a:ext>
             </a:extLst>
           </p:cNvPr>
@@ -4131,7 +4302,43 @@
           <p:nvPr/>
         </p:nvPicPr>
         <p:blipFill>
-          <a:blip r:embed="rId2"/>
+          <a:blip r:embed="rId2">
+            <a:extLst>
+              <a:ext uri="{28A0092B-C50C-407E-A947-70E740481C1C}">
+                <a14:useLocalDpi xmlns:a14="http://schemas.microsoft.com/office/drawing/2010/main" val="0"/>
+              </a:ext>
+            </a:extLst>
+          </a:blip>
+          <a:stretch>
+            <a:fillRect/>
+          </a:stretch>
+        </p:blipFill>
+        <p:spPr>
+          <a:xfrm>
+            <a:off x="97016" y="2743043"/>
+            <a:ext cx="2562180" cy="1440000"/>
+          </a:xfrm>
+          <a:prstGeom prst="rect">
+            <a:avLst/>
+          </a:prstGeom>
+        </p:spPr>
+      </p:pic>
+      <p:pic>
+        <p:nvPicPr>
+          <p:cNvPr id="5" name="Picture 4">
+            <a:extLst>
+              <a:ext uri="{FF2B5EF4-FFF2-40B4-BE49-F238E27FC236}">
+                <a16:creationId xmlns:a16="http://schemas.microsoft.com/office/drawing/2014/main" id="{A9917661-DD47-499D-ADA3-09FB9CEFD0B6}"/>
+              </a:ext>
+            </a:extLst>
+          </p:cNvPr>
+          <p:cNvPicPr>
+            <a:picLocks noChangeAspect="1"/>
+          </p:cNvPicPr>
+          <p:nvPr/>
+        </p:nvPicPr>
+        <p:blipFill>
+          <a:blip r:embed="rId3"/>
           <a:stretch>
             <a:fillRect/>
           </a:stretch>
@@ -4144,49 +4351,6 @@
           <a:prstGeom prst="rect">
             <a:avLst/>
           </a:prstGeom>
-        </p:spPr>
-      </p:pic>
-      <p:pic>
-        <p:nvPicPr>
-          <p:cNvPr id="3" name="Picture 2">
-            <a:extLst>
-              <a:ext uri="{FF2B5EF4-FFF2-40B4-BE49-F238E27FC236}">
-                <a16:creationId xmlns:a16="http://schemas.microsoft.com/office/drawing/2014/main" id="{1D251076-4C18-4EC3-8B0A-2FE421E96E3E}"/>
-              </a:ext>
-            </a:extLst>
-          </p:cNvPr>
-          <p:cNvPicPr>
-            <a:picLocks noChangeAspect="1"/>
-          </p:cNvPicPr>
-          <p:nvPr/>
-        </p:nvPicPr>
-        <p:blipFill>
-          <a:blip r:embed="rId3">
-            <a:extLst>
-              <a:ext uri="{28A0092B-C50C-407E-A947-70E740481C1C}">
-                <a14:useLocalDpi xmlns:a14="http://schemas.microsoft.com/office/drawing/2010/main" val="0"/>
-              </a:ext>
-            </a:extLst>
-          </a:blip>
-          <a:stretch>
-            <a:fillRect/>
-          </a:stretch>
-        </p:blipFill>
-        <p:spPr>
-          <a:xfrm>
-            <a:off x="65970" y="2756904"/>
-            <a:ext cx="2562180" cy="1440000"/>
-          </a:xfrm>
-          <a:prstGeom prst="rect">
-            <a:avLst/>
-          </a:prstGeom>
-          <a:ln w="6350">
-            <a:solidFill>
-              <a:schemeClr val="bg1">
-                <a:lumMod val="50000"/>
-              </a:schemeClr>
-            </a:solidFill>
-          </a:ln>
         </p:spPr>
       </p:pic>
       <p:cxnSp>
@@ -4313,10 +4477,10 @@
       </p:grpSpPr>
       <p:pic>
         <p:nvPicPr>
-          <p:cNvPr id="6" name="Picture 5">
-            <a:extLst>
-              <a:ext uri="{FF2B5EF4-FFF2-40B4-BE49-F238E27FC236}">
-                <a16:creationId xmlns:a16="http://schemas.microsoft.com/office/drawing/2014/main" id="{0CF2E5D3-CB70-4025-8642-37A6C1632E3E}"/>
+          <p:cNvPr id="4" name="Picture 3">
+            <a:extLst>
+              <a:ext uri="{FF2B5EF4-FFF2-40B4-BE49-F238E27FC236}">
+                <a16:creationId xmlns:a16="http://schemas.microsoft.com/office/drawing/2014/main" id="{7D211156-A236-47C8-A6E0-C31E5B960D5B}"/>
               </a:ext>
             </a:extLst>
           </p:cNvPr>
@@ -4326,37 +4490,7 @@
           <p:nvPr/>
         </p:nvPicPr>
         <p:blipFill>
-          <a:blip r:embed="rId2"/>
-          <a:stretch>
-            <a:fillRect/>
-          </a:stretch>
-        </p:blipFill>
-        <p:spPr>
-          <a:xfrm>
-            <a:off x="3162144" y="1765087"/>
-            <a:ext cx="6809822" cy="3444539"/>
-          </a:xfrm>
-          <a:prstGeom prst="rect">
-            <a:avLst/>
-          </a:prstGeom>
-        </p:spPr>
-      </p:pic>
-      <p:pic>
-        <p:nvPicPr>
-          <p:cNvPr id="3" name="Picture 2">
-            <a:extLst>
-              <a:ext uri="{FF2B5EF4-FFF2-40B4-BE49-F238E27FC236}">
-                <a16:creationId xmlns:a16="http://schemas.microsoft.com/office/drawing/2014/main" id="{02A2988B-A9A1-4989-983B-5C044E548A10}"/>
-              </a:ext>
-            </a:extLst>
-          </p:cNvPr>
-          <p:cNvPicPr>
-            <a:picLocks noChangeAspect="1"/>
-          </p:cNvPicPr>
-          <p:nvPr/>
-        </p:nvPicPr>
-        <p:blipFill>
-          <a:blip r:embed="rId3">
+          <a:blip r:embed="rId2">
             <a:extLst>
               <a:ext uri="{28A0092B-C50C-407E-A947-70E740481C1C}">
                 <a14:useLocalDpi xmlns:a14="http://schemas.microsoft.com/office/drawing/2010/main" val="0"/>
@@ -4375,13 +4509,36 @@
           <a:prstGeom prst="rect">
             <a:avLst/>
           </a:prstGeom>
-          <a:ln w="6350">
-            <a:solidFill>
-              <a:schemeClr val="bg1">
-                <a:lumMod val="50000"/>
-              </a:schemeClr>
-            </a:solidFill>
-          </a:ln>
+        </p:spPr>
+      </p:pic>
+      <p:pic>
+        <p:nvPicPr>
+          <p:cNvPr id="6" name="Picture 5">
+            <a:extLst>
+              <a:ext uri="{FF2B5EF4-FFF2-40B4-BE49-F238E27FC236}">
+                <a16:creationId xmlns:a16="http://schemas.microsoft.com/office/drawing/2014/main" id="{0CF2E5D3-CB70-4025-8642-37A6C1632E3E}"/>
+              </a:ext>
+            </a:extLst>
+          </p:cNvPr>
+          <p:cNvPicPr>
+            <a:picLocks noChangeAspect="1"/>
+          </p:cNvPicPr>
+          <p:nvPr/>
+        </p:nvPicPr>
+        <p:blipFill>
+          <a:blip r:embed="rId3"/>
+          <a:stretch>
+            <a:fillRect/>
+          </a:stretch>
+        </p:blipFill>
+        <p:spPr>
+          <a:xfrm>
+            <a:off x="3162144" y="1765087"/>
+            <a:ext cx="6809822" cy="3444539"/>
+          </a:xfrm>
+          <a:prstGeom prst="rect">
+            <a:avLst/>
+          </a:prstGeom>
         </p:spPr>
       </p:pic>
       <p:cxnSp>
@@ -4508,10 +4665,10 @@
       </p:grpSpPr>
       <p:pic>
         <p:nvPicPr>
-          <p:cNvPr id="6" name="Picture 5">
-            <a:extLst>
-              <a:ext uri="{FF2B5EF4-FFF2-40B4-BE49-F238E27FC236}">
-                <a16:creationId xmlns:a16="http://schemas.microsoft.com/office/drawing/2014/main" id="{A580A17A-68E5-438C-B457-EAA937FD82B9}"/>
+          <p:cNvPr id="4" name="Picture 3">
+            <a:extLst>
+              <a:ext uri="{FF2B5EF4-FFF2-40B4-BE49-F238E27FC236}">
+                <a16:creationId xmlns:a16="http://schemas.microsoft.com/office/drawing/2014/main" id="{0D1E4CE5-A32E-4EBC-9FC1-EEDBF01969AE}"/>
               </a:ext>
             </a:extLst>
           </p:cNvPr>
@@ -4521,7 +4678,43 @@
           <p:nvPr/>
         </p:nvPicPr>
         <p:blipFill>
-          <a:blip r:embed="rId2"/>
+          <a:blip r:embed="rId2">
+            <a:extLst>
+              <a:ext uri="{28A0092B-C50C-407E-A947-70E740481C1C}">
+                <a14:useLocalDpi xmlns:a14="http://schemas.microsoft.com/office/drawing/2010/main" val="0"/>
+              </a:ext>
+            </a:extLst>
+          </a:blip>
+          <a:stretch>
+            <a:fillRect/>
+          </a:stretch>
+        </p:blipFill>
+        <p:spPr>
+          <a:xfrm>
+            <a:off x="88741" y="2747573"/>
+            <a:ext cx="2562180" cy="1440000"/>
+          </a:xfrm>
+          <a:prstGeom prst="rect">
+            <a:avLst/>
+          </a:prstGeom>
+        </p:spPr>
+      </p:pic>
+      <p:pic>
+        <p:nvPicPr>
+          <p:cNvPr id="6" name="Picture 5">
+            <a:extLst>
+              <a:ext uri="{FF2B5EF4-FFF2-40B4-BE49-F238E27FC236}">
+                <a16:creationId xmlns:a16="http://schemas.microsoft.com/office/drawing/2014/main" id="{A580A17A-68E5-438C-B457-EAA937FD82B9}"/>
+              </a:ext>
+            </a:extLst>
+          </p:cNvPr>
+          <p:cNvPicPr>
+            <a:picLocks noChangeAspect="1"/>
+          </p:cNvPicPr>
+          <p:nvPr/>
+        </p:nvPicPr>
+        <p:blipFill>
+          <a:blip r:embed="rId3"/>
           <a:stretch>
             <a:fillRect/>
           </a:stretch>
@@ -4534,49 +4727,6 @@
           <a:prstGeom prst="rect">
             <a:avLst/>
           </a:prstGeom>
-        </p:spPr>
-      </p:pic>
-      <p:pic>
-        <p:nvPicPr>
-          <p:cNvPr id="3" name="Picture 2">
-            <a:extLst>
-              <a:ext uri="{FF2B5EF4-FFF2-40B4-BE49-F238E27FC236}">
-                <a16:creationId xmlns:a16="http://schemas.microsoft.com/office/drawing/2014/main" id="{81F9BA15-B68B-4F43-B052-ED817346D4AE}"/>
-              </a:ext>
-            </a:extLst>
-          </p:cNvPr>
-          <p:cNvPicPr>
-            <a:picLocks noChangeAspect="1"/>
-          </p:cNvPicPr>
-          <p:nvPr/>
-        </p:nvPicPr>
-        <p:blipFill>
-          <a:blip r:embed="rId3">
-            <a:extLst>
-              <a:ext uri="{28A0092B-C50C-407E-A947-70E740481C1C}">
-                <a14:useLocalDpi xmlns:a14="http://schemas.microsoft.com/office/drawing/2010/main" val="0"/>
-              </a:ext>
-            </a:extLst>
-          </a:blip>
-          <a:stretch>
-            <a:fillRect/>
-          </a:stretch>
-        </p:blipFill>
-        <p:spPr>
-          <a:xfrm>
-            <a:off x="100896" y="2747573"/>
-            <a:ext cx="2562180" cy="1440000"/>
-          </a:xfrm>
-          <a:prstGeom prst="rect">
-            <a:avLst/>
-          </a:prstGeom>
-          <a:ln w="6350">
-            <a:solidFill>
-              <a:schemeClr val="bg1">
-                <a:lumMod val="50000"/>
-              </a:schemeClr>
-            </a:solidFill>
-          </a:ln>
         </p:spPr>
       </p:pic>
       <p:cxnSp>
@@ -4995,6 +5145,216 @@
     <p:extLst>
       <p:ext uri="{BB962C8B-B14F-4D97-AF65-F5344CB8AC3E}">
         <p14:creationId xmlns:p14="http://schemas.microsoft.com/office/powerpoint/2010/main" val="2150016624"/>
+      </p:ext>
+    </p:extLst>
+  </p:cSld>
+  <p:clrMapOvr>
+    <a:masterClrMapping/>
+  </p:clrMapOvr>
+</p:sld>
+</file>
+
+<file path=ppt/slides/slide6.xml><?xml version="1.0" encoding="utf-8"?>
+<p:sld xmlns:a="http://schemas.openxmlformats.org/drawingml/2006/main" xmlns:r="http://schemas.openxmlformats.org/officeDocument/2006/relationships" xmlns:p="http://schemas.openxmlformats.org/presentationml/2006/main">
+  <p:cSld>
+    <p:bg>
+      <p:bgPr>
+        <a:solidFill>
+          <a:schemeClr val="bg1"/>
+        </a:solidFill>
+        <a:effectLst/>
+      </p:bgPr>
+    </p:bg>
+    <p:spTree>
+      <p:nvGrpSpPr>
+        <p:cNvPr id="1" name=""/>
+        <p:cNvGrpSpPr/>
+        <p:nvPr/>
+      </p:nvGrpSpPr>
+      <p:grpSpPr>
+        <a:xfrm>
+          <a:off x="0" y="0"/>
+          <a:ext cx="0" cy="0"/>
+          <a:chOff x="0" y="0"/>
+          <a:chExt cx="0" cy="0"/>
+        </a:xfrm>
+      </p:grpSpPr>
+      <p:sp>
+        <p:nvSpPr>
+          <p:cNvPr id="13" name="Rectangle 8">
+            <a:extLst>
+              <a:ext uri="{FF2B5EF4-FFF2-40B4-BE49-F238E27FC236}">
+                <a16:creationId xmlns:a16="http://schemas.microsoft.com/office/drawing/2014/main" id="{01D0AF59-99C3-4251-AB9A-C966C6AD4400}"/>
+              </a:ext>
+              <a:ext uri="{C183D7F6-B498-43B3-948B-1728B52AA6E4}">
+                <adec:decorative xmlns:adec="http://schemas.microsoft.com/office/drawing/2017/decorative" val="1"/>
+              </a:ext>
+            </a:extLst>
+          </p:cNvPr>
+          <p:cNvSpPr>
+            <a:spLocks noGrp="1" noRot="1" noChangeAspect="1" noMove="1" noResize="1" noEditPoints="1" noAdjustHandles="1" noChangeArrowheads="1" noChangeShapeType="1" noTextEdit="1"/>
+          </p:cNvSpPr>
+          <p:nvPr>
+            <p:extLst>
+              <p:ext uri="{386F3935-93C4-4BCD-93E2-E3B085C9AB24}">
+                <p16:designElem xmlns:p16="http://schemas.microsoft.com/office/powerpoint/2015/main" val="1"/>
+              </p:ext>
+            </p:extLst>
+          </p:nvPr>
+        </p:nvSpPr>
+        <p:spPr>
+          <a:xfrm>
+            <a:off x="0" y="0"/>
+            <a:ext cx="12192000" cy="6858000"/>
+          </a:xfrm>
+          <a:prstGeom prst="rect">
+            <a:avLst/>
+          </a:prstGeom>
+          <a:solidFill>
+            <a:schemeClr val="bg2"/>
+          </a:solidFill>
+          <a:ln>
+            <a:noFill/>
+          </a:ln>
+        </p:spPr>
+        <p:style>
+          <a:lnRef idx="2">
+            <a:schemeClr val="accent1">
+              <a:shade val="50000"/>
+            </a:schemeClr>
+          </a:lnRef>
+          <a:fillRef idx="1">
+            <a:schemeClr val="accent1"/>
+          </a:fillRef>
+          <a:effectRef idx="0">
+            <a:schemeClr val="accent1"/>
+          </a:effectRef>
+          <a:fontRef idx="minor">
+            <a:schemeClr val="lt1"/>
+          </a:fontRef>
+        </p:style>
+        <p:txBody>
+          <a:bodyPr rtlCol="0" anchor="ctr"/>
+          <a:lstStyle/>
+          <a:p>
+            <a:pPr algn="ctr"/>
+            <a:endParaRPr lang="en-US"/>
+          </a:p>
+        </p:txBody>
+      </p:sp>
+      <p:sp>
+        <p:nvSpPr>
+          <p:cNvPr id="14" name="Rectangle 10">
+            <a:extLst>
+              <a:ext uri="{FF2B5EF4-FFF2-40B4-BE49-F238E27FC236}">
+                <a16:creationId xmlns:a16="http://schemas.microsoft.com/office/drawing/2014/main" id="{1855405F-37A2-4869-9154-F8BE3BECE6C3}"/>
+              </a:ext>
+              <a:ext uri="{C183D7F6-B498-43B3-948B-1728B52AA6E4}">
+                <adec:decorative xmlns:adec="http://schemas.microsoft.com/office/drawing/2017/decorative" val="1"/>
+              </a:ext>
+            </a:extLst>
+          </p:cNvPr>
+          <p:cNvSpPr>
+            <a:spLocks noGrp="1" noRot="1" noChangeAspect="1" noMove="1" noResize="1" noEditPoints="1" noAdjustHandles="1" noChangeArrowheads="1" noChangeShapeType="1" noTextEdit="1"/>
+          </p:cNvSpPr>
+          <p:nvPr>
+            <p:extLst>
+              <p:ext uri="{386F3935-93C4-4BCD-93E2-E3B085C9AB24}">
+                <p16:designElem xmlns:p16="http://schemas.microsoft.com/office/powerpoint/2015/main" val="1"/>
+              </p:ext>
+            </p:extLst>
+          </p:nvPr>
+        </p:nvSpPr>
+        <p:spPr>
+          <a:xfrm>
+            <a:off x="477012" y="480060"/>
+            <a:ext cx="11237976" cy="5897880"/>
+          </a:xfrm>
+          <a:prstGeom prst="rect">
+            <a:avLst/>
+          </a:prstGeom>
+          <a:solidFill>
+            <a:srgbClr val="FFFFFF"/>
+          </a:solidFill>
+          <a:ln w="9525">
+            <a:noFill/>
+          </a:ln>
+          <a:effectLst>
+            <a:outerShdw blurRad="63500" dist="17780" dir="5400000" algn="t" rotWithShape="0">
+              <a:prstClr val="black">
+                <a:alpha val="43000"/>
+              </a:prstClr>
+            </a:outerShdw>
+          </a:effectLst>
+        </p:spPr>
+        <p:style>
+          <a:lnRef idx="2">
+            <a:schemeClr val="accent1">
+              <a:shade val="50000"/>
+            </a:schemeClr>
+          </a:lnRef>
+          <a:fillRef idx="1">
+            <a:schemeClr val="accent1"/>
+          </a:fillRef>
+          <a:effectRef idx="0">
+            <a:schemeClr val="accent1"/>
+          </a:effectRef>
+          <a:fontRef idx="minor">
+            <a:schemeClr val="lt1"/>
+          </a:fontRef>
+        </p:style>
+        <p:txBody>
+          <a:bodyPr rtlCol="0" anchor="ctr"/>
+          <a:lstStyle/>
+          <a:p>
+            <a:pPr algn="ctr"/>
+            <a:endParaRPr lang="en-US"/>
+          </a:p>
+        </p:txBody>
+      </p:sp>
+      <p:pic>
+        <p:nvPicPr>
+          <p:cNvPr id="3" name="Picture 2">
+            <a:extLst>
+              <a:ext uri="{FF2B5EF4-FFF2-40B4-BE49-F238E27FC236}">
+                <a16:creationId xmlns:a16="http://schemas.microsoft.com/office/drawing/2014/main" id="{571D036B-EF27-4899-8BF2-528FF9BDCC0B}"/>
+              </a:ext>
+            </a:extLst>
+          </p:cNvPr>
+          <p:cNvPicPr>
+            <a:picLocks noChangeAspect="1"/>
+          </p:cNvPicPr>
+          <p:nvPr/>
+        </p:nvPicPr>
+        <p:blipFill>
+          <a:blip r:embed="rId2">
+            <a:extLst>
+              <a:ext uri="{28A0092B-C50C-407E-A947-70E740481C1C}">
+                <a14:useLocalDpi xmlns:a14="http://schemas.microsoft.com/office/drawing/2010/main" val="0"/>
+              </a:ext>
+              <a:ext uri="{837473B0-CC2E-450A-ABE3-18F120FF3D39}">
+                <a1611:picAttrSrcUrl xmlns:a1611="http://schemas.microsoft.com/office/drawing/2016/11/main" r:id="rId3"/>
+              </a:ext>
+            </a:extLst>
+          </a:blip>
+          <a:stretch>
+            <a:fillRect/>
+          </a:stretch>
+        </p:blipFill>
+        <p:spPr>
+          <a:xfrm>
+            <a:off x="2029528" y="643467"/>
+            <a:ext cx="8132943" cy="5571066"/>
+          </a:xfrm>
+          <a:prstGeom prst="rect">
+            <a:avLst/>
+          </a:prstGeom>
+        </p:spPr>
+      </p:pic>
+    </p:spTree>
+    <p:extLst>
+      <p:ext uri="{BB962C8B-B14F-4D97-AF65-F5344CB8AC3E}">
+        <p14:creationId xmlns:p14="http://schemas.microsoft.com/office/powerpoint/2010/main" val="2768809047"/>
       </p:ext>
     </p:extLst>
   </p:cSld>

</xml_diff>